<commit_message>
Add slides regarding trilateration
</commit_message>
<xml_diff>
--- a/presentation.pptx
+++ b/presentation.pptx
@@ -5,25 +5,29 @@
     <p:sldMasterId id="2147483648" r:id="rId1"/>
   </p:sldMasterIdLst>
   <p:notesMasterIdLst>
-    <p:notesMasterId r:id="rId15"/>
+    <p:notesMasterId r:id="rId19"/>
   </p:notesMasterIdLst>
   <p:handoutMasterIdLst>
-    <p:handoutMasterId r:id="rId16"/>
+    <p:handoutMasterId r:id="rId20"/>
   </p:handoutMasterIdLst>
   <p:sldIdLst>
     <p:sldId id="256" r:id="rId2"/>
     <p:sldId id="258" r:id="rId3"/>
-    <p:sldId id="257" r:id="rId4"/>
-    <p:sldId id="262" r:id="rId5"/>
-    <p:sldId id="261" r:id="rId6"/>
-    <p:sldId id="260" r:id="rId7"/>
-    <p:sldId id="259" r:id="rId8"/>
+    <p:sldId id="262" r:id="rId4"/>
+    <p:sldId id="261" r:id="rId5"/>
+    <p:sldId id="260" r:id="rId6"/>
+    <p:sldId id="259" r:id="rId7"/>
+    <p:sldId id="269" r:id="rId8"/>
     <p:sldId id="264" r:id="rId9"/>
     <p:sldId id="263" r:id="rId10"/>
     <p:sldId id="266" r:id="rId11"/>
     <p:sldId id="265" r:id="rId12"/>
-    <p:sldId id="267" r:id="rId13"/>
-    <p:sldId id="268" r:id="rId14"/>
+    <p:sldId id="270" r:id="rId13"/>
+    <p:sldId id="271" r:id="rId14"/>
+    <p:sldId id="273" r:id="rId15"/>
+    <p:sldId id="272" r:id="rId16"/>
+    <p:sldId id="267" r:id="rId17"/>
+    <p:sldId id="268" r:id="rId18"/>
   </p:sldIdLst>
   <p:sldSz cx="9144000" cy="6858000" type="screen4x3"/>
   <p:notesSz cx="6858000" cy="9144000"/>
@@ -152,6 +156,36 @@
       </a:defRPr>
     </a:lvl9pPr>
   </p:defaultTextStyle>
+  <p:extLst>
+    <p:ext uri="{EFAFB233-063F-42B5-8137-9DF3F51BA10A}">
+      <p15:sldGuideLst xmlns:p15="http://schemas.microsoft.com/office/powerpoint/2012/main">
+        <p15:guide id="1" orient="horz" pos="2160">
+          <p15:clr>
+            <a:srgbClr val="A4A3A4"/>
+          </p15:clr>
+        </p15:guide>
+        <p15:guide id="2" pos="2880">
+          <p15:clr>
+            <a:srgbClr val="A4A3A4"/>
+          </p15:clr>
+        </p15:guide>
+      </p15:sldGuideLst>
+    </p:ext>
+    <p:ext uri="{2D200454-40CA-4A62-9FC3-DE9A4176ACB9}">
+      <p15:notesGuideLst xmlns:p15="http://schemas.microsoft.com/office/powerpoint/2012/main">
+        <p15:guide id="1" orient="horz" pos="2880">
+          <p15:clr>
+            <a:srgbClr val="A4A3A4"/>
+          </p15:clr>
+        </p15:guide>
+        <p15:guide id="2" pos="2160">
+          <p15:clr>
+            <a:srgbClr val="A4A3A4"/>
+          </p15:clr>
+        </p15:guide>
+      </p15:notesGuideLst>
+    </p:ext>
+  </p:extLst>
 </p:presentation>
 </file>
 
@@ -264,7 +298,7 @@
               <a:pPr>
                 <a:defRPr/>
               </a:pPr>
-              <a:t>15.05.2014</a:t>
+              <a:t>04.07.2014</a:t>
             </a:fld>
             <a:endParaRPr lang="ro-RO"/>
           </a:p>
@@ -364,6 +398,11 @@
         </p:txBody>
       </p:sp>
     </p:spTree>
+    <p:extLst>
+      <p:ext uri="{BB962C8B-B14F-4D97-AF65-F5344CB8AC3E}">
+        <p14:creationId xmlns:p14="http://schemas.microsoft.com/office/powerpoint/2010/main" val="3720823933"/>
+      </p:ext>
+    </p:extLst>
   </p:cSld>
   <p:clrMap bg1="lt1" tx1="dk1" bg2="lt2" tx2="dk2" accent1="accent1" accent2="accent2" accent3="accent3" accent4="accent4" accent5="accent5" accent6="accent6" hlink="hlink" folHlink="folHlink"/>
 </p:handoutMaster>
@@ -478,7 +517,7 @@
               <a:pPr>
                 <a:defRPr/>
               </a:pPr>
-              <a:t>15.05.2014</a:t>
+              <a:t>04.07.2014</a:t>
             </a:fld>
             <a:endParaRPr lang="ro-RO"/>
           </a:p>
@@ -674,6 +713,11 @@
         </p:txBody>
       </p:sp>
     </p:spTree>
+    <p:extLst>
+      <p:ext uri="{BB962C8B-B14F-4D97-AF65-F5344CB8AC3E}">
+        <p14:creationId xmlns:p14="http://schemas.microsoft.com/office/powerpoint/2010/main" val="1200220815"/>
+      </p:ext>
+    </p:extLst>
   </p:cSld>
   <p:clrMap bg1="lt1" tx1="dk1" bg2="lt2" tx2="dk2" accent1="accent1" accent2="accent2" accent3="accent3" accent4="accent4" accent5="accent5" accent6="accent6" hlink="hlink" folHlink="folHlink"/>
   <p:notesStyle>
@@ -801,6 +845,96 @@
 </p:notesMaster>
 </file>
 
+<file path=ppt/notesSlides/notesSlide1.xml><?xml version="1.0" encoding="utf-8"?>
+<p:notes xmlns:a="http://schemas.openxmlformats.org/drawingml/2006/main" xmlns:r="http://schemas.openxmlformats.org/officeDocument/2006/relationships" xmlns:p="http://schemas.openxmlformats.org/presentationml/2006/main">
+  <p:cSld>
+    <p:spTree>
+      <p:nvGrpSpPr>
+        <p:cNvPr id="1" name=""/>
+        <p:cNvGrpSpPr/>
+        <p:nvPr/>
+      </p:nvGrpSpPr>
+      <p:grpSpPr>
+        <a:xfrm>
+          <a:off x="0" y="0"/>
+          <a:ext cx="0" cy="0"/>
+          <a:chOff x="0" y="0"/>
+          <a:chExt cx="0" cy="0"/>
+        </a:xfrm>
+      </p:grpSpPr>
+      <p:sp>
+        <p:nvSpPr>
+          <p:cNvPr id="2" name="Slide Image Placeholder 1"/>
+          <p:cNvSpPr>
+            <a:spLocks noGrp="1" noRot="1" noChangeAspect="1"/>
+          </p:cNvSpPr>
+          <p:nvPr>
+            <p:ph type="sldImg"/>
+          </p:nvPr>
+        </p:nvSpPr>
+        <p:spPr/>
+      </p:sp>
+      <p:sp>
+        <p:nvSpPr>
+          <p:cNvPr id="3" name="Notes Placeholder 2"/>
+          <p:cNvSpPr>
+            <a:spLocks noGrp="1"/>
+          </p:cNvSpPr>
+          <p:nvPr>
+            <p:ph type="body" idx="1"/>
+          </p:nvPr>
+        </p:nvSpPr>
+        <p:spPr/>
+        <p:txBody>
+          <a:bodyPr/>
+          <a:lstStyle/>
+          <a:p>
+            <a:endParaRPr lang="en-US"/>
+          </a:p>
+        </p:txBody>
+      </p:sp>
+      <p:sp>
+        <p:nvSpPr>
+          <p:cNvPr id="4" name="Slide Number Placeholder 3"/>
+          <p:cNvSpPr>
+            <a:spLocks noGrp="1"/>
+          </p:cNvSpPr>
+          <p:nvPr>
+            <p:ph type="sldNum" sz="quarter" idx="10"/>
+          </p:nvPr>
+        </p:nvSpPr>
+        <p:spPr/>
+        <p:txBody>
+          <a:bodyPr/>
+          <a:lstStyle/>
+          <a:p>
+            <a:pPr>
+              <a:defRPr/>
+            </a:pPr>
+            <a:fld id="{E564878A-A787-422A-8474-FD81F0FD3E8F}" type="slidenum">
+              <a:rPr lang="ro-RO" smtClean="0"/>
+              <a:pPr>
+                <a:defRPr/>
+              </a:pPr>
+              <a:t>12</a:t>
+            </a:fld>
+            <a:endParaRPr lang="ro-RO"/>
+          </a:p>
+        </p:txBody>
+      </p:sp>
+    </p:spTree>
+    <p:extLst>
+      <p:ext uri="{BB962C8B-B14F-4D97-AF65-F5344CB8AC3E}">
+        <p14:creationId xmlns:p14="http://schemas.microsoft.com/office/powerpoint/2010/main" val="3111517673"/>
+      </p:ext>
+    </p:extLst>
+  </p:cSld>
+  <p:clrMapOvr>
+    <a:masterClrMapping/>
+  </p:clrMapOvr>
+</p:notes>
+</file>
+
 <file path=ppt/slideLayouts/slideLayout1.xml><?xml version="1.0" encoding="utf-8"?>
 <p:sldLayout xmlns:a="http://schemas.openxmlformats.org/drawingml/2006/main" xmlns:r="http://schemas.openxmlformats.org/officeDocument/2006/relationships" xmlns:p="http://schemas.openxmlformats.org/presentationml/2006/main" preserve="1" userDrawn="1">
   <p:cSld name="Title Slide">
@@ -1548,12 +1682,9 @@
             <a:pPr>
               <a:defRPr/>
             </a:pPr>
-            <a:fld id="{7B5C4901-21FD-4589-82E8-B2FA75B49350}" type="datetime1">
+            <a:fld id="{6B2B5584-7694-40AE-B166-48E92AF0EE9C}" type="datetime1">
               <a:rPr lang="ro-RO" smtClean="0"/>
-              <a:pPr>
-                <a:defRPr/>
-              </a:pPr>
-              <a:t>15.05.2014</a:t>
+              <a:t>04.07.2014</a:t>
             </a:fld>
             <a:endParaRPr lang="ro-RO"/>
           </a:p>
@@ -1582,8 +1713,8 @@
               <a:defRPr/>
             </a:pPr>
             <a:r>
-              <a:rPr lang="vi-VN" dirty="0" smtClean="0"/>
-              <a:t>Sesiunea de Comunicări Științifice Studențești -  Mai 2014</a:t>
+              <a:rPr lang="vi-VN" smtClean="0"/>
+              <a:t>Sesiunea de Licențe - Iulie 2014</a:t>
             </a:r>
             <a:endParaRPr lang="ro-RO" dirty="0"/>
           </a:p>
@@ -1789,12 +1920,9 @@
             <a:pPr>
               <a:defRPr/>
             </a:pPr>
-            <a:fld id="{E78CC8C5-8903-4657-B894-C2DD35C16913}" type="datetime1">
+            <a:fld id="{2F5B183D-8484-4750-9C9C-BB2364FCF362}" type="datetime1">
               <a:rPr lang="ro-RO" smtClean="0"/>
-              <a:pPr>
-                <a:defRPr/>
-              </a:pPr>
-              <a:t>15.05.2014</a:t>
+              <a:t>04.07.2014</a:t>
             </a:fld>
             <a:endParaRPr lang="ro-RO"/>
           </a:p>
@@ -1823,8 +1951,8 @@
               <a:defRPr/>
             </a:pPr>
             <a:r>
-              <a:rPr lang="vi-VN" dirty="0" smtClean="0"/>
-              <a:t>Sesiunea de Comunicări Științifice Studențești -  Mai 2014</a:t>
+              <a:rPr lang="vi-VN" smtClean="0"/>
+              <a:t>Sesiunea de Licențe - Iulie 2014</a:t>
             </a:r>
             <a:endParaRPr lang="ro-RO" dirty="0"/>
           </a:p>
@@ -2138,12 +2266,9 @@
             <a:pPr>
               <a:defRPr/>
             </a:pPr>
-            <a:fld id="{0B8576FB-04B7-4952-A2B5-50D4A4605A32}" type="datetime1">
+            <a:fld id="{ABA79D62-32BF-4278-9DBA-DC3B475645A6}" type="datetime1">
               <a:rPr lang="ro-RO" smtClean="0"/>
-              <a:pPr>
-                <a:defRPr/>
-              </a:pPr>
-              <a:t>15.05.2014</a:t>
+              <a:t>04.07.2014</a:t>
             </a:fld>
             <a:endParaRPr lang="ro-RO"/>
           </a:p>
@@ -2186,8 +2311,8 @@
               <a:defRPr/>
             </a:pPr>
             <a:r>
-              <a:rPr lang="vi-VN" dirty="0" smtClean="0"/>
-              <a:t>Sesiunea de Comunicări Științifice Studențești -  Mai 2014</a:t>
+              <a:rPr lang="vi-VN" smtClean="0"/>
+              <a:t>Sesiunea de Licențe - Iulie 2014</a:t>
             </a:r>
             <a:endParaRPr lang="ro-RO" dirty="0">
               <a:latin typeface="Arial" charset="0"/>
@@ -2426,12 +2551,9 @@
             <a:pPr>
               <a:defRPr/>
             </a:pPr>
-            <a:fld id="{9E51E023-A181-4C79-A198-EE6A8908AE48}" type="datetime1">
+            <a:fld id="{0A1A5A78-8843-4B9B-A829-1FA8A838A391}" type="datetime1">
               <a:rPr lang="ro-RO" smtClean="0"/>
-              <a:pPr>
-                <a:defRPr/>
-              </a:pPr>
-              <a:t>15.05.2014</a:t>
+              <a:t>04.07.2014</a:t>
             </a:fld>
             <a:endParaRPr lang="ro-RO" dirty="0"/>
           </a:p>
@@ -2460,8 +2582,8 @@
               <a:defRPr/>
             </a:pPr>
             <a:r>
-              <a:rPr lang="vi-VN" dirty="0" smtClean="0"/>
-              <a:t>Sesiunea de Comunicări Științifice Studențești -  Mai 2014</a:t>
+              <a:rPr lang="vi-VN" smtClean="0"/>
+              <a:t>Sesiunea de Licențe - Iulie 2014</a:t>
             </a:r>
             <a:endParaRPr lang="ro-RO" dirty="0"/>
           </a:p>
@@ -2888,12 +3010,9 @@
             <a:pPr>
               <a:defRPr/>
             </a:pPr>
-            <a:fld id="{D85BCC5B-3342-4ED7-805C-8F06CCEEC8BC}" type="datetime1">
+            <a:fld id="{5129E6DB-88CE-4945-A183-6E7B99A12347}" type="datetime1">
               <a:rPr lang="ro-RO" smtClean="0"/>
-              <a:pPr>
-                <a:defRPr/>
-              </a:pPr>
-              <a:t>15.05.2014</a:t>
+              <a:t>04.07.2014</a:t>
             </a:fld>
             <a:endParaRPr lang="ro-RO"/>
           </a:p>
@@ -2922,8 +3041,8 @@
               <a:defRPr/>
             </a:pPr>
             <a:r>
-              <a:rPr lang="vi-VN" dirty="0" smtClean="0"/>
-              <a:t>Sesiunea de Comunicări Științifice Studențești -  Mai 2014</a:t>
+              <a:rPr lang="vi-VN" smtClean="0"/>
+              <a:t>Sesiunea de Licențe - Iulie 2014</a:t>
             </a:r>
             <a:endParaRPr lang="ro-RO" dirty="0"/>
           </a:p>
@@ -3480,12 +3599,9 @@
             <a:pPr>
               <a:defRPr/>
             </a:pPr>
-            <a:fld id="{D779940B-BA3F-4B74-9290-A7F85F768693}" type="datetime1">
+            <a:fld id="{5AB8FBE9-50F5-442D-AFA9-8F3D0F6E6994}" type="datetime1">
               <a:rPr lang="ro-RO" smtClean="0"/>
-              <a:pPr>
-                <a:defRPr/>
-              </a:pPr>
-              <a:t>15.05.2014</a:t>
+              <a:t>04.07.2014</a:t>
             </a:fld>
             <a:endParaRPr lang="ro-RO"/>
           </a:p>
@@ -3514,8 +3630,8 @@
               <a:defRPr/>
             </a:pPr>
             <a:r>
-              <a:rPr lang="vi-VN" dirty="0" smtClean="0"/>
-              <a:t>Sesiunea de Comunicări Științifice Studențești -  Mai 2014</a:t>
+              <a:rPr lang="vi-VN" smtClean="0"/>
+              <a:t>Sesiunea de Licențe - Iulie 2014</a:t>
             </a:r>
             <a:endParaRPr lang="ro-RO" dirty="0"/>
           </a:p>
@@ -3772,12 +3888,9 @@
             <a:pPr>
               <a:defRPr/>
             </a:pPr>
-            <a:fld id="{0086BD40-4EC3-4A65-8155-03606411E417}" type="datetime1">
+            <a:fld id="{844E9919-79BE-4F7B-B106-3D65755DB545}" type="datetime1">
               <a:rPr lang="ro-RO" smtClean="0"/>
-              <a:pPr>
-                <a:defRPr/>
-              </a:pPr>
-              <a:t>15.05.2014</a:t>
+              <a:t>04.07.2014</a:t>
             </a:fld>
             <a:endParaRPr lang="ro-RO"/>
           </a:p>
@@ -3806,8 +3919,8 @@
               <a:defRPr/>
             </a:pPr>
             <a:r>
-              <a:rPr lang="vi-VN" dirty="0" smtClean="0"/>
-              <a:t>Sesiunea de Comunicări Științifice Studențești -  Mai 2014</a:t>
+              <a:rPr lang="vi-VN" smtClean="0"/>
+              <a:t>Sesiunea de Licențe - Iulie 2014</a:t>
             </a:r>
             <a:endParaRPr lang="ro-RO" dirty="0"/>
           </a:p>
@@ -3928,12 +4041,9 @@
             <a:pPr>
               <a:defRPr/>
             </a:pPr>
-            <a:fld id="{FC264B8F-D48F-4883-B96E-0F6322041042}" type="datetime1">
+            <a:fld id="{C8D3A6B7-3589-4A70-BE63-BFD024EA0159}" type="datetime1">
               <a:rPr lang="ro-RO" smtClean="0"/>
-              <a:pPr>
-                <a:defRPr/>
-              </a:pPr>
-              <a:t>15.05.2014</a:t>
+              <a:t>04.07.2014</a:t>
             </a:fld>
             <a:endParaRPr lang="ro-RO"/>
           </a:p>
@@ -3962,8 +4072,8 @@
               <a:defRPr/>
             </a:pPr>
             <a:r>
-              <a:rPr lang="vi-VN" dirty="0" smtClean="0"/>
-              <a:t>Sesiunea de Comunicări Științifice Studențești -  Mai 2014</a:t>
+              <a:rPr lang="vi-VN" smtClean="0"/>
+              <a:t>Sesiunea de Licențe - Iulie 2014</a:t>
             </a:r>
             <a:endParaRPr lang="ro-RO" dirty="0"/>
           </a:p>
@@ -4266,12 +4376,9 @@
             <a:pPr>
               <a:defRPr/>
             </a:pPr>
-            <a:fld id="{273AA91E-DD9D-4771-BC47-ABF2F08C3506}" type="datetime1">
+            <a:fld id="{A93612E8-9E4D-4364-9B31-1717D02F6CCD}" type="datetime1">
               <a:rPr lang="ro-RO" smtClean="0"/>
-              <a:pPr>
-                <a:defRPr/>
-              </a:pPr>
-              <a:t>15.05.2014</a:t>
+              <a:t>04.07.2014</a:t>
             </a:fld>
             <a:endParaRPr lang="ro-RO"/>
           </a:p>
@@ -4300,8 +4407,8 @@
               <a:defRPr/>
             </a:pPr>
             <a:r>
-              <a:rPr lang="vi-VN" dirty="0" smtClean="0"/>
-              <a:t>Sesiunea de Comunicări Științifice Studențești -  Mai 2014</a:t>
+              <a:rPr lang="vi-VN" smtClean="0"/>
+              <a:t>Sesiunea de Licențe - Iulie 2014</a:t>
             </a:r>
             <a:endParaRPr lang="ro-RO" dirty="0"/>
           </a:p>
@@ -4583,12 +4690,9 @@
             <a:pPr>
               <a:defRPr/>
             </a:pPr>
-            <a:fld id="{BCAD2B82-3A2C-4211-AA74-B3F90F0F1D68}" type="datetime1">
+            <a:fld id="{EA152455-E624-48D1-915A-ECB4E61EDD72}" type="datetime1">
               <a:rPr lang="ro-RO" smtClean="0"/>
-              <a:pPr>
-                <a:defRPr/>
-              </a:pPr>
-              <a:t>15.05.2014</a:t>
+              <a:t>04.07.2014</a:t>
             </a:fld>
             <a:endParaRPr lang="ro-RO"/>
           </a:p>
@@ -4617,8 +4721,8 @@
               <a:defRPr/>
             </a:pPr>
             <a:r>
-              <a:rPr lang="vi-VN" dirty="0" smtClean="0"/>
-              <a:t>Sesiunea de Comunicări Științifice Studențești -  Mai 2014</a:t>
+              <a:rPr lang="vi-VN" smtClean="0"/>
+              <a:t>Sesiunea de Licențe - Iulie 2014</a:t>
             </a:r>
             <a:endParaRPr lang="ro-RO" dirty="0"/>
           </a:p>
@@ -4845,12 +4949,9 @@
             <a:pPr>
               <a:defRPr/>
             </a:pPr>
-            <a:fld id="{EBD187A8-877B-45FC-9A59-B7683274F06F}" type="datetime1">
+            <a:fld id="{5C2BF893-7B5A-4403-A11A-DB0DEC1A9627}" type="datetime1">
               <a:rPr lang="ro-RO" smtClean="0"/>
-              <a:pPr>
-                <a:defRPr/>
-              </a:pPr>
-              <a:t>15.05.2014</a:t>
+              <a:t>04.07.2014</a:t>
             </a:fld>
             <a:endParaRPr lang="ro-RO" dirty="0"/>
           </a:p>
@@ -4901,8 +5002,8 @@
               <a:defRPr/>
             </a:pPr>
             <a:r>
-              <a:rPr lang="vi-VN" dirty="0" smtClean="0"/>
-              <a:t>Sesiunea de Comunicări Științifice Studențești -  Mai 2014</a:t>
+              <a:rPr lang="vi-VN" smtClean="0"/>
+              <a:t>Sesiunea de Licențe - Iulie 2014</a:t>
             </a:r>
             <a:endParaRPr lang="ro-RO" dirty="0"/>
           </a:p>
@@ -5498,23 +5599,27 @@
           </a:bodyPr>
           <a:lstStyle/>
           <a:p>
-            <a:pPr eaLnBrk="1" hangingPunct="1"/>
-            <a:r>
-              <a:rPr lang="en-US" dirty="0" err="1" smtClean="0"/>
+            <a:r>
+              <a:rPr lang="en-US" altLang="en-US" dirty="0" err="1"/>
               <a:t>Sesiunea</a:t>
             </a:r>
             <a:r>
-              <a:rPr lang="en-US" dirty="0" smtClean="0"/>
+              <a:rPr lang="en-US" altLang="en-US" dirty="0"/>
               <a:t> de </a:t>
             </a:r>
             <a:r>
-              <a:rPr lang="en-US" dirty="0" err="1" smtClean="0"/>
-              <a:t>Comunic</a:t>
-            </a:r>
-            <a:r>
-              <a:rPr lang="ro-RO" dirty="0" smtClean="0"/>
-              <a:t>ări Științifice Studențești -  Mai 2014</a:t>
-            </a:r>
+              <a:rPr lang="en-US" altLang="en-US" dirty="0" err="1"/>
+              <a:t>licen</a:t>
+            </a:r>
+            <a:r>
+              <a:rPr lang="ro-RO" altLang="en-US" dirty="0"/>
+              <a:t>ţe - Iulie </a:t>
+            </a:r>
+            <a:r>
+              <a:rPr lang="ro-RO" altLang="en-US" dirty="0" smtClean="0"/>
+              <a:t>2014</a:t>
+            </a:r>
+            <a:endParaRPr lang="ro-RO" altLang="en-US" dirty="0"/>
           </a:p>
         </p:txBody>
       </p:sp>
@@ -5591,10 +5696,10 @@
             <a:pPr>
               <a:defRPr/>
             </a:pPr>
-            <a:r>
-              <a:rPr lang="ro-RO" dirty="0" smtClean="0"/>
-              <a:t>16.05.2014</a:t>
-            </a:r>
+            <a:fld id="{520AE5A2-5888-4375-BFA4-6629656DCE89}" type="datetime1">
+              <a:rPr lang="ro-RO" smtClean="0"/>
+              <a:t>04.07.2014</a:t>
+            </a:fld>
             <a:endParaRPr lang="ro-RO" dirty="0"/>
           </a:p>
         </p:txBody>
@@ -5614,16 +5719,11 @@
           <a:bodyPr/>
           <a:lstStyle/>
           <a:p>
-            <a:pPr>
-              <a:defRPr/>
-            </a:pPr>
-            <a:r>
-              <a:rPr lang="vi-VN" dirty="0" smtClean="0"/>
-              <a:t>Sesiunea de Comunicări Științifice Studențești -  Mai 2014</a:t>
-            </a:r>
-            <a:endParaRPr lang="ro-RO" dirty="0">
-              <a:latin typeface="Arial" charset="0"/>
-            </a:endParaRPr>
+            <a:r>
+              <a:rPr lang="vi-VN" altLang="en-US" smtClean="0"/>
+              <a:t>Sesiunea de Licențe - Iulie 2014</a:t>
+            </a:r>
+            <a:endParaRPr lang="ro-RO" altLang="en-US" dirty="0"/>
           </a:p>
         </p:txBody>
       </p:sp>
@@ -5745,10 +5845,10 @@
             <a:pPr>
               <a:defRPr/>
             </a:pPr>
-            <a:r>
-              <a:rPr lang="ro-RO" dirty="0" smtClean="0"/>
-              <a:t>16.05.2014</a:t>
-            </a:r>
+            <a:fld id="{CDEFA70E-185C-4C31-8C8C-328336DDB284}" type="datetime1">
+              <a:rPr lang="ro-RO" smtClean="0"/>
+              <a:t>04.07.2014</a:t>
+            </a:fld>
             <a:endParaRPr lang="ro-RO" dirty="0"/>
           </a:p>
         </p:txBody>
@@ -5768,16 +5868,11 @@
           <a:bodyPr/>
           <a:lstStyle/>
           <a:p>
-            <a:pPr>
-              <a:defRPr/>
-            </a:pPr>
-            <a:r>
-              <a:rPr lang="vi-VN" dirty="0" smtClean="0"/>
-              <a:t>Sesiunea de Comunicări Științifice Studențești -  Mai 2014</a:t>
-            </a:r>
-            <a:endParaRPr lang="ro-RO" dirty="0">
-              <a:latin typeface="Arial" charset="0"/>
-            </a:endParaRPr>
+            <a:r>
+              <a:rPr lang="vi-VN" altLang="en-US" smtClean="0"/>
+              <a:t>Sesiunea de Licențe - Iulie 2014</a:t>
+            </a:r>
+            <a:endParaRPr lang="ro-RO" altLang="en-US" dirty="0"/>
           </a:p>
         </p:txBody>
       </p:sp>
@@ -5953,7 +6048,7 @@
           <a:p>
             <a:r>
               <a:rPr lang="ro-RO" dirty="0" smtClean="0"/>
-              <a:t>Future work</a:t>
+              <a:t>Rezultate amprente radio</a:t>
             </a:r>
             <a:endParaRPr lang="en-US" dirty="0"/>
           </a:p>
@@ -5974,39 +6069,7 @@
           <a:bodyPr/>
           <a:lstStyle/>
           <a:p>
-            <a:r>
-              <a:rPr lang="ro-RO" dirty="0" smtClean="0"/>
-              <a:t>Algoritm de poziționare</a:t>
-            </a:r>
-          </a:p>
-          <a:p>
-            <a:pPr lvl="1"/>
-            <a:r>
-              <a:rPr lang="ro-RO" dirty="0" smtClean="0"/>
-              <a:t>Nearest neighbor (NN) in signal space</a:t>
-            </a:r>
-          </a:p>
-          <a:p>
-            <a:pPr lvl="1"/>
-            <a:r>
-              <a:rPr lang="ro-RO" dirty="0" smtClean="0"/>
-              <a:t>KNN</a:t>
-            </a:r>
-          </a:p>
-          <a:p>
-            <a:pPr lvl="1"/>
-            <a:r>
-              <a:rPr lang="ro-RO" dirty="0" smtClean="0"/>
-              <a:t>WKNN - weighted</a:t>
-            </a:r>
-          </a:p>
-          <a:p>
-            <a:pPr lvl="1"/>
-            <a:r>
-              <a:rPr lang="ro-RO" dirty="0" smtClean="0"/>
-              <a:t>EWKNN - enhanced weighted</a:t>
-            </a:r>
-            <a:endParaRPr lang="en-US" dirty="0"/>
+            <a:endParaRPr lang="en-US"/>
           </a:p>
         </p:txBody>
       </p:sp>
@@ -6028,11 +6091,11 @@
             <a:pPr>
               <a:defRPr/>
             </a:pPr>
-            <a:r>
-              <a:rPr lang="ro-RO" dirty="0" smtClean="0"/>
-              <a:t>16.05.2014</a:t>
-            </a:r>
-            <a:endParaRPr lang="ro-RO" dirty="0"/>
+            <a:fld id="{0BB1AF95-E9A8-4577-B748-4DB5C6717C1A}" type="datetime1">
+              <a:rPr lang="ro-RO" smtClean="0"/>
+              <a:t>04.07.2014</a:t>
+            </a:fld>
+            <a:endParaRPr lang="ro-RO"/>
           </a:p>
         </p:txBody>
       </p:sp>
@@ -6055,8 +6118,8 @@
               <a:defRPr/>
             </a:pPr>
             <a:r>
-              <a:rPr lang="vi-VN" dirty="0" smtClean="0"/>
-              <a:t>Sesiunea de Comunicări Științifice Studențești -  Mai 2014</a:t>
+              <a:rPr lang="vi-VN" smtClean="0"/>
+              <a:t>Sesiunea de Licențe - Iulie 2014</a:t>
             </a:r>
             <a:endParaRPr lang="ro-RO" dirty="0">
               <a:latin typeface="Arial" charset="0"/>
@@ -6094,6 +6157,11 @@
         </p:txBody>
       </p:sp>
     </p:spTree>
+    <p:extLst>
+      <p:ext uri="{BB962C8B-B14F-4D97-AF65-F5344CB8AC3E}">
+        <p14:creationId xmlns:p14="http://schemas.microsoft.com/office/powerpoint/2010/main" val="3905354368"/>
+      </p:ext>
+    </p:extLst>
   </p:cSld>
   <p:clrMapOvr>
     <a:masterClrMapping/>
@@ -6135,65 +6203,41 @@
           <a:p>
             <a:r>
               <a:rPr lang="ro-RO" dirty="0" smtClean="0"/>
-              <a:t>Întrebări</a:t>
+              <a:t>Trilaterație</a:t>
             </a:r>
             <a:endParaRPr lang="en-US" dirty="0"/>
           </a:p>
         </p:txBody>
       </p:sp>
-      <p:sp>
-        <p:nvSpPr>
-          <p:cNvPr id="3" name="Content Placeholder 2"/>
-          <p:cNvSpPr>
-            <a:spLocks noGrp="1"/>
-          </p:cNvSpPr>
+      <p:pic>
+        <p:nvPicPr>
+          <p:cNvPr id="7" name="Content Placeholder 6"/>
+          <p:cNvPicPr>
+            <a:picLocks noGrp="1" noChangeAspect="1"/>
+          </p:cNvPicPr>
           <p:nvPr>
             <p:ph idx="1"/>
           </p:nvPr>
-        </p:nvSpPr>
-        <p:spPr/>
-        <p:txBody>
-          <a:bodyPr/>
-          <a:lstStyle/>
-          <a:p>
-            <a:r>
-              <a:rPr lang="ro-RO" dirty="0" smtClean="0"/>
-              <a:t>Poziționare în interior</a:t>
-            </a:r>
-          </a:p>
-          <a:p>
-            <a:r>
-              <a:rPr lang="ro-RO" dirty="0" smtClean="0"/>
-              <a:t>Wi-Fi 802.11 Beacons</a:t>
-            </a:r>
-          </a:p>
-          <a:p>
-            <a:r>
-              <a:rPr lang="ro-RO" dirty="0" smtClean="0"/>
-              <a:t>Hartă, off-line phase</a:t>
-            </a:r>
-          </a:p>
-          <a:p>
-            <a:r>
-              <a:rPr lang="ro-RO" dirty="0" smtClean="0"/>
-              <a:t>Aplicație Android</a:t>
-            </a:r>
-          </a:p>
-          <a:p>
-            <a:r>
-              <a:rPr lang="ro-RO" dirty="0" smtClean="0"/>
-              <a:t>Analiză</a:t>
-            </a:r>
-          </a:p>
-          <a:p>
-            <a:r>
-              <a:rPr lang="ro-RO" dirty="0" smtClean="0"/>
-              <a:t>Algoritm</a:t>
-            </a:r>
-            <a:endParaRPr lang="en-US" dirty="0"/>
-          </a:p>
-        </p:txBody>
-      </p:sp>
+        </p:nvPicPr>
+        <p:blipFill>
+          <a:blip r:embed="rId2">
+            <a:extLst>
+              <a:ext uri="{28A0092B-C50C-407E-A947-70E740481C1C}">
+                <a14:useLocalDpi xmlns:a14="http://schemas.microsoft.com/office/drawing/2010/main" val="0"/>
+              </a:ext>
+            </a:extLst>
+          </a:blip>
+          <a:stretch>
+            <a:fillRect/>
+          </a:stretch>
+        </p:blipFill>
+        <p:spPr>
+          <a:xfrm>
+            <a:off x="2476500" y="1678781"/>
+            <a:ext cx="4191000" cy="4000500"/>
+          </a:xfrm>
+        </p:spPr>
+      </p:pic>
       <p:sp>
         <p:nvSpPr>
           <p:cNvPr id="4" name="Date Placeholder 3"/>
@@ -6212,11 +6256,11 @@
             <a:pPr>
               <a:defRPr/>
             </a:pPr>
-            <a:r>
-              <a:rPr lang="ro-RO" dirty="0" smtClean="0"/>
-              <a:t>16.05.2014</a:t>
-            </a:r>
-            <a:endParaRPr lang="ro-RO" dirty="0"/>
+            <a:fld id="{E2DC7101-90AE-4A1B-865D-35B6CCB09438}" type="datetime1">
+              <a:rPr lang="ro-RO" smtClean="0"/>
+              <a:t>04.07.2014</a:t>
+            </a:fld>
+            <a:endParaRPr lang="ro-RO"/>
           </a:p>
         </p:txBody>
       </p:sp>
@@ -6239,8 +6283,8 @@
               <a:defRPr/>
             </a:pPr>
             <a:r>
-              <a:rPr lang="vi-VN" dirty="0" smtClean="0"/>
-              <a:t>Sesiunea de Comunicări Științifice Studențești -  Mai 2014</a:t>
+              <a:rPr lang="vi-VN" smtClean="0"/>
+              <a:t>Sesiunea de Licențe - Iulie 2014</a:t>
             </a:r>
             <a:endParaRPr lang="ro-RO" dirty="0">
               <a:latin typeface="Arial" charset="0"/>
@@ -6272,6 +6316,948 @@
                 <a:defRPr/>
               </a:pPr>
               <a:t>13</a:t>
+            </a:fld>
+            <a:endParaRPr lang="ro-RO"/>
+          </a:p>
+        </p:txBody>
+      </p:sp>
+    </p:spTree>
+    <p:extLst>
+      <p:ext uri="{BB962C8B-B14F-4D97-AF65-F5344CB8AC3E}">
+        <p14:creationId xmlns:p14="http://schemas.microsoft.com/office/powerpoint/2010/main" val="3154985860"/>
+      </p:ext>
+    </p:extLst>
+  </p:cSld>
+  <p:clrMapOvr>
+    <a:masterClrMapping/>
+  </p:clrMapOvr>
+</p:sld>
+</file>
+
+<file path=ppt/slides/slide14.xml><?xml version="1.0" encoding="utf-8"?>
+<p:sld xmlns:a="http://schemas.openxmlformats.org/drawingml/2006/main" xmlns:r="http://schemas.openxmlformats.org/officeDocument/2006/relationships" xmlns:p="http://schemas.openxmlformats.org/presentationml/2006/main">
+  <p:cSld>
+    <p:spTree>
+      <p:nvGrpSpPr>
+        <p:cNvPr id="1" name=""/>
+        <p:cNvGrpSpPr/>
+        <p:nvPr/>
+      </p:nvGrpSpPr>
+      <p:grpSpPr>
+        <a:xfrm>
+          <a:off x="0" y="0"/>
+          <a:ext cx="0" cy="0"/>
+          <a:chOff x="0" y="0"/>
+          <a:chExt cx="0" cy="0"/>
+        </a:xfrm>
+      </p:grpSpPr>
+      <p:sp>
+        <p:nvSpPr>
+          <p:cNvPr id="2" name="Title 1"/>
+          <p:cNvSpPr>
+            <a:spLocks noGrp="1"/>
+          </p:cNvSpPr>
+          <p:nvPr>
+            <p:ph type="title"/>
+          </p:nvPr>
+        </p:nvSpPr>
+        <p:spPr/>
+        <p:txBody>
+          <a:bodyPr/>
+          <a:lstStyle/>
+          <a:p>
+            <a:endParaRPr lang="en-US"/>
+          </a:p>
+        </p:txBody>
+      </p:sp>
+      <mc:AlternateContent xmlns:mc="http://schemas.openxmlformats.org/markup-compatibility/2006">
+        <mc:Choice xmlns:a14="http://schemas.microsoft.com/office/drawing/2010/main" Requires="a14">
+          <p:sp>
+            <p:nvSpPr>
+              <p:cNvPr id="3" name="Content Placeholder 2"/>
+              <p:cNvSpPr>
+                <a:spLocks noGrp="1"/>
+              </p:cNvSpPr>
+              <p:nvPr>
+                <p:ph idx="1"/>
+              </p:nvPr>
+            </p:nvSpPr>
+            <p:spPr/>
+            <p:txBody>
+              <a:bodyPr/>
+              <a:lstStyle/>
+              <a:p>
+                <a:pPr marL="514350" indent="-514350">
+                  <a:buFont typeface="+mj-lt"/>
+                  <a:buAutoNum type="arabicPeriod"/>
+                </a:pPr>
+                <a:r>
+                  <a:rPr lang="ro-RO" sz="2800" dirty="0" smtClean="0"/>
+                  <a:t>P1</a:t>
+                </a:r>
+                <a:r>
+                  <a:rPr lang="ro-RO" sz="2800" dirty="0"/>
+                  <a:t>, P2, P3 – </a:t>
+                </a:r>
+                <a:r>
+                  <a:rPr lang="ro-RO" sz="2800" dirty="0" smtClean="0"/>
+                  <a:t>pozițiile </a:t>
+                </a:r>
+                <a:r>
+                  <a:rPr lang="ro-RO" sz="2800" dirty="0"/>
+                  <a:t>AP-urilor, trebuie </a:t>
+                </a:r>
+                <a:r>
+                  <a:rPr lang="ro-RO" sz="2800" dirty="0" smtClean="0"/>
+                  <a:t>cunoscute în prealabil</a:t>
+                </a:r>
+                <a:endParaRPr lang="ro-RO" sz="2800" dirty="0"/>
+              </a:p>
+              <a:p>
+                <a:pPr marL="514350" indent="-514350">
+                  <a:buFont typeface="+mj-lt"/>
+                  <a:buAutoNum type="arabicPeriod"/>
+                </a:pPr>
+                <a:r>
+                  <a:rPr lang="ro-RO" sz="2800" dirty="0"/>
+                  <a:t>r1, r2, r3 – distanțele între dispozitiv și AP-uri, trebuie </a:t>
+                </a:r>
+                <a:r>
+                  <a:rPr lang="ro-RO" sz="2800" dirty="0" smtClean="0"/>
+                  <a:t>determinate</a:t>
+                </a:r>
+                <a:endParaRPr lang="en-US" sz="2800" dirty="0"/>
+              </a:p>
+              <a:p>
+                <a:pPr marL="514350" indent="-514350">
+                  <a:buFont typeface="+mj-lt"/>
+                  <a:buAutoNum type="arabicPeriod"/>
+                </a:pPr>
+                <a:r>
+                  <a:rPr lang="ro-RO" sz="2800" dirty="0"/>
+                  <a:t>poziția estimată </a:t>
+                </a:r>
+                <a:r>
+                  <a:rPr lang="ro-RO" sz="2800" dirty="0" smtClean="0"/>
+                  <a:t>E, se calculează pe baza sistemului matematic:</a:t>
+                </a:r>
+                <a:endParaRPr lang="ro-RO" sz="2400" dirty="0"/>
+              </a:p>
+              <a:p>
+                <a:pPr lvl="1">
+                  <a:buFont typeface="Wingdings" panose="05000000000000000000" pitchFamily="2" charset="2"/>
+                  <a:buChar char="§"/>
+                </a:pPr>
+                <a14:m>
+                  <m:oMath xmlns:m="http://schemas.openxmlformats.org/officeDocument/2006/math">
+                    <m:sSup>
+                      <m:sSupPr>
+                        <m:ctrlPr>
+                          <a:rPr lang="ro-RO" sz="2400" i="1" smtClean="0">
+                            <a:latin typeface="Cambria Math" panose="02040503050406030204" pitchFamily="18" charset="0"/>
+                          </a:rPr>
+                        </m:ctrlPr>
+                      </m:sSupPr>
+                      <m:e>
+                        <m:r>
+                          <a:rPr lang="ro-RO" sz="2400" b="0" i="1" smtClean="0">
+                            <a:latin typeface="Cambria Math" panose="02040503050406030204" pitchFamily="18" charset="0"/>
+                          </a:rPr>
+                          <m:t>(</m:t>
+                        </m:r>
+                        <m:r>
+                          <a:rPr lang="ro-RO" sz="2400" b="0" i="1" smtClean="0">
+                            <a:latin typeface="Cambria Math" panose="02040503050406030204" pitchFamily="18" charset="0"/>
+                          </a:rPr>
+                          <m:t>𝐸</m:t>
+                        </m:r>
+                        <m:r>
+                          <a:rPr lang="ro-RO" sz="2400" b="0" i="1" smtClean="0">
+                            <a:latin typeface="Cambria Math" panose="02040503050406030204" pitchFamily="18" charset="0"/>
+                          </a:rPr>
+                          <m:t>.</m:t>
+                        </m:r>
+                        <m:r>
+                          <a:rPr lang="ro-RO" sz="2400" b="0" i="1" smtClean="0">
+                            <a:latin typeface="Cambria Math" panose="02040503050406030204" pitchFamily="18" charset="0"/>
+                          </a:rPr>
+                          <m:t>𝑥</m:t>
+                        </m:r>
+                        <m:r>
+                          <a:rPr lang="ro-RO" sz="2400" b="0" i="1" smtClean="0">
+                            <a:latin typeface="Cambria Math" panose="02040503050406030204" pitchFamily="18" charset="0"/>
+                          </a:rPr>
+                          <m:t> −</m:t>
+                        </m:r>
+                        <m:r>
+                          <a:rPr lang="ro-RO" sz="2400" b="0" i="1" smtClean="0">
+                            <a:latin typeface="Cambria Math" panose="02040503050406030204" pitchFamily="18" charset="0"/>
+                          </a:rPr>
+                          <m:t>𝑃</m:t>
+                        </m:r>
+                        <m:r>
+                          <a:rPr lang="ro-RO" sz="2400" b="0" i="1" smtClean="0">
+                            <a:latin typeface="Cambria Math" panose="02040503050406030204" pitchFamily="18" charset="0"/>
+                          </a:rPr>
+                          <m:t>1.</m:t>
+                        </m:r>
+                        <m:r>
+                          <a:rPr lang="ro-RO" sz="2400" b="0" i="1" smtClean="0">
+                            <a:latin typeface="Cambria Math" panose="02040503050406030204" pitchFamily="18" charset="0"/>
+                          </a:rPr>
+                          <m:t>𝑥</m:t>
+                        </m:r>
+                        <m:r>
+                          <a:rPr lang="ro-RO" sz="2400" b="0" i="1" smtClean="0">
+                            <a:latin typeface="Cambria Math" panose="02040503050406030204" pitchFamily="18" charset="0"/>
+                          </a:rPr>
+                          <m:t>)</m:t>
+                        </m:r>
+                      </m:e>
+                      <m:sup>
+                        <m:r>
+                          <a:rPr lang="ro-RO" sz="2400" i="1" smtClean="0">
+                            <a:latin typeface="Cambria Math" panose="02040503050406030204" pitchFamily="18" charset="0"/>
+                          </a:rPr>
+                          <m:t>2</m:t>
+                        </m:r>
+                      </m:sup>
+                    </m:sSup>
+                    <m:r>
+                      <a:rPr lang="ro-RO" sz="2400" i="1" smtClean="0">
+                        <a:latin typeface="Cambria Math" panose="02040503050406030204" pitchFamily="18" charset="0"/>
+                      </a:rPr>
+                      <m:t>+</m:t>
+                    </m:r>
+                    <m:sSup>
+                      <m:sSupPr>
+                        <m:ctrlPr>
+                          <a:rPr lang="ro-RO" sz="2400" i="1" smtClean="0">
+                            <a:latin typeface="Cambria Math" panose="02040503050406030204" pitchFamily="18" charset="0"/>
+                          </a:rPr>
+                        </m:ctrlPr>
+                      </m:sSupPr>
+                      <m:e>
+                        <m:r>
+                          <a:rPr lang="ro-RO" sz="2400" b="0" i="1" smtClean="0">
+                            <a:latin typeface="Cambria Math" panose="02040503050406030204" pitchFamily="18" charset="0"/>
+                          </a:rPr>
+                          <m:t>(</m:t>
+                        </m:r>
+                        <m:r>
+                          <a:rPr lang="ro-RO" sz="2400" b="0" i="1" smtClean="0">
+                            <a:latin typeface="Cambria Math" panose="02040503050406030204" pitchFamily="18" charset="0"/>
+                          </a:rPr>
+                          <m:t>𝐸</m:t>
+                        </m:r>
+                        <m:r>
+                          <a:rPr lang="ro-RO" sz="2400" b="0" i="1" smtClean="0">
+                            <a:latin typeface="Cambria Math" panose="02040503050406030204" pitchFamily="18" charset="0"/>
+                          </a:rPr>
+                          <m:t>.</m:t>
+                        </m:r>
+                        <m:r>
+                          <a:rPr lang="ro-RO" sz="2400" b="0" i="1" smtClean="0">
+                            <a:latin typeface="Cambria Math" panose="02040503050406030204" pitchFamily="18" charset="0"/>
+                          </a:rPr>
+                          <m:t>𝑦</m:t>
+                        </m:r>
+                        <m:r>
+                          <a:rPr lang="ro-RO" sz="2400" b="0" i="1" smtClean="0">
+                            <a:latin typeface="Cambria Math" panose="02040503050406030204" pitchFamily="18" charset="0"/>
+                          </a:rPr>
+                          <m:t> −</m:t>
+                        </m:r>
+                        <m:r>
+                          <a:rPr lang="ro-RO" sz="2400" b="0" i="1" smtClean="0">
+                            <a:latin typeface="Cambria Math" panose="02040503050406030204" pitchFamily="18" charset="0"/>
+                          </a:rPr>
+                          <m:t>𝑃</m:t>
+                        </m:r>
+                        <m:r>
+                          <a:rPr lang="ro-RO" sz="2400" b="0" i="1" smtClean="0">
+                            <a:latin typeface="Cambria Math" panose="02040503050406030204" pitchFamily="18" charset="0"/>
+                          </a:rPr>
+                          <m:t>1.</m:t>
+                        </m:r>
+                        <m:r>
+                          <a:rPr lang="ro-RO" sz="2400" b="0" i="1" smtClean="0">
+                            <a:latin typeface="Cambria Math" panose="02040503050406030204" pitchFamily="18" charset="0"/>
+                          </a:rPr>
+                          <m:t>𝑦</m:t>
+                        </m:r>
+                        <m:r>
+                          <a:rPr lang="ro-RO" sz="2400" b="0" i="1" smtClean="0">
+                            <a:latin typeface="Cambria Math" panose="02040503050406030204" pitchFamily="18" charset="0"/>
+                          </a:rPr>
+                          <m:t>)</m:t>
+                        </m:r>
+                      </m:e>
+                      <m:sup>
+                        <m:r>
+                          <a:rPr lang="ro-RO" sz="2400" i="1" smtClean="0">
+                            <a:latin typeface="Cambria Math" panose="02040503050406030204" pitchFamily="18" charset="0"/>
+                          </a:rPr>
+                          <m:t>2</m:t>
+                        </m:r>
+                      </m:sup>
+                    </m:sSup>
+                    <m:r>
+                      <a:rPr lang="ro-RO" sz="2400" i="1" smtClean="0">
+                        <a:latin typeface="Cambria Math" panose="02040503050406030204" pitchFamily="18" charset="0"/>
+                      </a:rPr>
+                      <m:t>=</m:t>
+                    </m:r>
+                    <m:sSup>
+                      <m:sSupPr>
+                        <m:ctrlPr>
+                          <a:rPr lang="ro-RO" sz="2400" i="1" smtClean="0">
+                            <a:latin typeface="Cambria Math" panose="02040503050406030204" pitchFamily="18" charset="0"/>
+                          </a:rPr>
+                        </m:ctrlPr>
+                      </m:sSupPr>
+                      <m:e>
+                        <m:r>
+                          <a:rPr lang="ro-RO" sz="2400" b="0" i="1" smtClean="0">
+                            <a:latin typeface="Cambria Math" panose="02040503050406030204" pitchFamily="18" charset="0"/>
+                          </a:rPr>
+                          <m:t>𝑟</m:t>
+                        </m:r>
+                        <m:r>
+                          <a:rPr lang="ro-RO" sz="2400" b="0" i="1" smtClean="0">
+                            <a:latin typeface="Cambria Math" panose="02040503050406030204" pitchFamily="18" charset="0"/>
+                          </a:rPr>
+                          <m:t>1</m:t>
+                        </m:r>
+                      </m:e>
+                      <m:sup>
+                        <m:r>
+                          <a:rPr lang="ro-RO" sz="2400" i="1" smtClean="0">
+                            <a:latin typeface="Cambria Math" panose="02040503050406030204" pitchFamily="18" charset="0"/>
+                          </a:rPr>
+                          <m:t>2</m:t>
+                        </m:r>
+                      </m:sup>
+                    </m:sSup>
+                  </m:oMath>
+                </a14:m>
+                <a:endParaRPr lang="ro-RO" sz="2400" dirty="0" smtClean="0"/>
+              </a:p>
+              <a:p>
+                <a:pPr lvl="1">
+                  <a:buFont typeface="Wingdings" panose="05000000000000000000" pitchFamily="2" charset="2"/>
+                  <a:buChar char="§"/>
+                </a:pPr>
+                <a:r>
+                  <a:rPr lang="ro-RO" sz="2400" dirty="0" smtClean="0"/>
+                  <a:t>[...]</a:t>
+                </a:r>
+              </a:p>
+            </p:txBody>
+          </p:sp>
+        </mc:Choice>
+        <mc:Fallback>
+          <p:sp>
+            <p:nvSpPr>
+              <p:cNvPr id="3" name="Content Placeholder 2"/>
+              <p:cNvSpPr>
+                <a:spLocks noGrp="1" noRot="1" noChangeAspect="1" noMove="1" noResize="1" noEditPoints="1" noAdjustHandles="1" noChangeArrowheads="1" noChangeShapeType="1" noTextEdit="1"/>
+              </p:cNvSpPr>
+              <p:nvPr>
+                <p:ph idx="1"/>
+              </p:nvPr>
+            </p:nvSpPr>
+            <p:spPr>
+              <a:blipFill rotWithShape="0">
+                <a:blip r:embed="rId2"/>
+                <a:stretch>
+                  <a:fillRect l="-1556" r="-444"/>
+                </a:stretch>
+              </a:blipFill>
+            </p:spPr>
+            <p:txBody>
+              <a:bodyPr/>
+              <a:lstStyle/>
+              <a:p>
+                <a:r>
+                  <a:rPr lang="en-US">
+                    <a:noFill/>
+                  </a:rPr>
+                  <a:t> </a:t>
+                </a:r>
+              </a:p>
+            </p:txBody>
+          </p:sp>
+        </mc:Fallback>
+      </mc:AlternateContent>
+      <p:sp>
+        <p:nvSpPr>
+          <p:cNvPr id="4" name="Date Placeholder 3"/>
+          <p:cNvSpPr>
+            <a:spLocks noGrp="1"/>
+          </p:cNvSpPr>
+          <p:nvPr>
+            <p:ph type="dt" sz="half" idx="10"/>
+          </p:nvPr>
+        </p:nvSpPr>
+        <p:spPr/>
+        <p:txBody>
+          <a:bodyPr/>
+          <a:lstStyle/>
+          <a:p>
+            <a:pPr>
+              <a:defRPr/>
+            </a:pPr>
+            <a:fld id="{ABA79D62-32BF-4278-9DBA-DC3B475645A6}" type="datetime1">
+              <a:rPr lang="ro-RO" smtClean="0"/>
+              <a:t>04.07.2014</a:t>
+            </a:fld>
+            <a:endParaRPr lang="ro-RO"/>
+          </a:p>
+        </p:txBody>
+      </p:sp>
+      <p:sp>
+        <p:nvSpPr>
+          <p:cNvPr id="5" name="Footer Placeholder 4"/>
+          <p:cNvSpPr>
+            <a:spLocks noGrp="1"/>
+          </p:cNvSpPr>
+          <p:nvPr>
+            <p:ph type="ftr" sz="quarter" idx="11"/>
+          </p:nvPr>
+        </p:nvSpPr>
+        <p:spPr/>
+        <p:txBody>
+          <a:bodyPr/>
+          <a:lstStyle/>
+          <a:p>
+            <a:pPr>
+              <a:defRPr/>
+            </a:pPr>
+            <a:r>
+              <a:rPr lang="vi-VN" smtClean="0"/>
+              <a:t>Sesiunea de Licențe - Iulie 2014</a:t>
+            </a:r>
+            <a:endParaRPr lang="ro-RO" dirty="0">
+              <a:latin typeface="Arial" charset="0"/>
+            </a:endParaRPr>
+          </a:p>
+        </p:txBody>
+      </p:sp>
+      <p:sp>
+        <p:nvSpPr>
+          <p:cNvPr id="6" name="Slide Number Placeholder 5"/>
+          <p:cNvSpPr>
+            <a:spLocks noGrp="1"/>
+          </p:cNvSpPr>
+          <p:nvPr>
+            <p:ph type="sldNum" sz="quarter" idx="12"/>
+          </p:nvPr>
+        </p:nvSpPr>
+        <p:spPr/>
+        <p:txBody>
+          <a:bodyPr/>
+          <a:lstStyle/>
+          <a:p>
+            <a:pPr>
+              <a:defRPr/>
+            </a:pPr>
+            <a:fld id="{99B47DFE-6EB8-448E-B63B-53036C43F0EB}" type="slidenum">
+              <a:rPr lang="ro-RO" smtClean="0"/>
+              <a:pPr>
+                <a:defRPr/>
+              </a:pPr>
+              <a:t>14</a:t>
+            </a:fld>
+            <a:endParaRPr lang="ro-RO"/>
+          </a:p>
+        </p:txBody>
+      </p:sp>
+    </p:spTree>
+    <p:extLst>
+      <p:ext uri="{BB962C8B-B14F-4D97-AF65-F5344CB8AC3E}">
+        <p14:creationId xmlns:p14="http://schemas.microsoft.com/office/powerpoint/2010/main" val="396729875"/>
+      </p:ext>
+    </p:extLst>
+  </p:cSld>
+  <p:clrMapOvr>
+    <a:masterClrMapping/>
+  </p:clrMapOvr>
+</p:sld>
+</file>
+
+<file path=ppt/slides/slide15.xml><?xml version="1.0" encoding="utf-8"?>
+<p:sld xmlns:a="http://schemas.openxmlformats.org/drawingml/2006/main" xmlns:r="http://schemas.openxmlformats.org/officeDocument/2006/relationships" xmlns:p="http://schemas.openxmlformats.org/presentationml/2006/main">
+  <p:cSld>
+    <p:spTree>
+      <p:nvGrpSpPr>
+        <p:cNvPr id="1" name=""/>
+        <p:cNvGrpSpPr/>
+        <p:nvPr/>
+      </p:nvGrpSpPr>
+      <p:grpSpPr>
+        <a:xfrm>
+          <a:off x="0" y="0"/>
+          <a:ext cx="0" cy="0"/>
+          <a:chOff x="0" y="0"/>
+          <a:chExt cx="0" cy="0"/>
+        </a:xfrm>
+      </p:grpSpPr>
+      <p:sp>
+        <p:nvSpPr>
+          <p:cNvPr id="2" name="Title 1"/>
+          <p:cNvSpPr>
+            <a:spLocks noGrp="1"/>
+          </p:cNvSpPr>
+          <p:nvPr>
+            <p:ph type="title"/>
+          </p:nvPr>
+        </p:nvSpPr>
+        <p:spPr/>
+        <p:txBody>
+          <a:bodyPr/>
+          <a:lstStyle/>
+          <a:p>
+            <a:endParaRPr lang="en-US"/>
+          </a:p>
+        </p:txBody>
+      </p:sp>
+      <p:sp>
+        <p:nvSpPr>
+          <p:cNvPr id="3" name="Content Placeholder 2"/>
+          <p:cNvSpPr>
+            <a:spLocks noGrp="1"/>
+          </p:cNvSpPr>
+          <p:nvPr>
+            <p:ph idx="1"/>
+          </p:nvPr>
+        </p:nvSpPr>
+        <p:spPr/>
+        <p:txBody>
+          <a:bodyPr/>
+          <a:lstStyle/>
+          <a:p>
+            <a:endParaRPr lang="en-US"/>
+          </a:p>
+        </p:txBody>
+      </p:sp>
+      <p:sp>
+        <p:nvSpPr>
+          <p:cNvPr id="4" name="Date Placeholder 3"/>
+          <p:cNvSpPr>
+            <a:spLocks noGrp="1"/>
+          </p:cNvSpPr>
+          <p:nvPr>
+            <p:ph type="dt" sz="half" idx="10"/>
+          </p:nvPr>
+        </p:nvSpPr>
+        <p:spPr/>
+        <p:txBody>
+          <a:bodyPr/>
+          <a:lstStyle/>
+          <a:p>
+            <a:pPr>
+              <a:defRPr/>
+            </a:pPr>
+            <a:fld id="{ABA79D62-32BF-4278-9DBA-DC3B475645A6}" type="datetime1">
+              <a:rPr lang="ro-RO" smtClean="0"/>
+              <a:t>04.07.2014</a:t>
+            </a:fld>
+            <a:endParaRPr lang="ro-RO"/>
+          </a:p>
+        </p:txBody>
+      </p:sp>
+      <p:sp>
+        <p:nvSpPr>
+          <p:cNvPr id="5" name="Footer Placeholder 4"/>
+          <p:cNvSpPr>
+            <a:spLocks noGrp="1"/>
+          </p:cNvSpPr>
+          <p:nvPr>
+            <p:ph type="ftr" sz="quarter" idx="11"/>
+          </p:nvPr>
+        </p:nvSpPr>
+        <p:spPr/>
+        <p:txBody>
+          <a:bodyPr/>
+          <a:lstStyle/>
+          <a:p>
+            <a:pPr>
+              <a:defRPr/>
+            </a:pPr>
+            <a:r>
+              <a:rPr lang="vi-VN" smtClean="0"/>
+              <a:t>Sesiunea de Licențe - Iulie 2014</a:t>
+            </a:r>
+            <a:endParaRPr lang="ro-RO" dirty="0">
+              <a:latin typeface="Arial" charset="0"/>
+            </a:endParaRPr>
+          </a:p>
+        </p:txBody>
+      </p:sp>
+      <p:sp>
+        <p:nvSpPr>
+          <p:cNvPr id="6" name="Slide Number Placeholder 5"/>
+          <p:cNvSpPr>
+            <a:spLocks noGrp="1"/>
+          </p:cNvSpPr>
+          <p:nvPr>
+            <p:ph type="sldNum" sz="quarter" idx="12"/>
+          </p:nvPr>
+        </p:nvSpPr>
+        <p:spPr/>
+        <p:txBody>
+          <a:bodyPr/>
+          <a:lstStyle/>
+          <a:p>
+            <a:pPr>
+              <a:defRPr/>
+            </a:pPr>
+            <a:fld id="{99B47DFE-6EB8-448E-B63B-53036C43F0EB}" type="slidenum">
+              <a:rPr lang="ro-RO" smtClean="0"/>
+              <a:pPr>
+                <a:defRPr/>
+              </a:pPr>
+              <a:t>15</a:t>
+            </a:fld>
+            <a:endParaRPr lang="ro-RO"/>
+          </a:p>
+        </p:txBody>
+      </p:sp>
+    </p:spTree>
+    <p:extLst>
+      <p:ext uri="{BB962C8B-B14F-4D97-AF65-F5344CB8AC3E}">
+        <p14:creationId xmlns:p14="http://schemas.microsoft.com/office/powerpoint/2010/main" val="3322724601"/>
+      </p:ext>
+    </p:extLst>
+  </p:cSld>
+  <p:clrMapOvr>
+    <a:masterClrMapping/>
+  </p:clrMapOvr>
+</p:sld>
+</file>
+
+<file path=ppt/slides/slide16.xml><?xml version="1.0" encoding="utf-8"?>
+<p:sld xmlns:a="http://schemas.openxmlformats.org/drawingml/2006/main" xmlns:r="http://schemas.openxmlformats.org/officeDocument/2006/relationships" xmlns:p="http://schemas.openxmlformats.org/presentationml/2006/main">
+  <p:cSld>
+    <p:spTree>
+      <p:nvGrpSpPr>
+        <p:cNvPr id="1" name=""/>
+        <p:cNvGrpSpPr/>
+        <p:nvPr/>
+      </p:nvGrpSpPr>
+      <p:grpSpPr>
+        <a:xfrm>
+          <a:off x="0" y="0"/>
+          <a:ext cx="0" cy="0"/>
+          <a:chOff x="0" y="0"/>
+          <a:chExt cx="0" cy="0"/>
+        </a:xfrm>
+      </p:grpSpPr>
+      <p:sp>
+        <p:nvSpPr>
+          <p:cNvPr id="2" name="Title 1"/>
+          <p:cNvSpPr>
+            <a:spLocks noGrp="1"/>
+          </p:cNvSpPr>
+          <p:nvPr>
+            <p:ph type="title"/>
+          </p:nvPr>
+        </p:nvSpPr>
+        <p:spPr/>
+        <p:txBody>
+          <a:bodyPr/>
+          <a:lstStyle/>
+          <a:p>
+            <a:r>
+              <a:rPr lang="ro-RO" dirty="0" smtClean="0"/>
+              <a:t>Future work</a:t>
+            </a:r>
+            <a:endParaRPr lang="en-US" dirty="0"/>
+          </a:p>
+        </p:txBody>
+      </p:sp>
+      <p:sp>
+        <p:nvSpPr>
+          <p:cNvPr id="3" name="Content Placeholder 2"/>
+          <p:cNvSpPr>
+            <a:spLocks noGrp="1"/>
+          </p:cNvSpPr>
+          <p:nvPr>
+            <p:ph idx="1"/>
+          </p:nvPr>
+        </p:nvSpPr>
+        <p:spPr/>
+        <p:txBody>
+          <a:bodyPr/>
+          <a:lstStyle/>
+          <a:p>
+            <a:r>
+              <a:rPr lang="ro-RO" dirty="0" smtClean="0"/>
+              <a:t>TODO</a:t>
+            </a:r>
+          </a:p>
+          <a:p>
+            <a:r>
+              <a:rPr lang="ro-RO" dirty="0" smtClean="0"/>
+              <a:t>GSM</a:t>
+            </a:r>
+            <a:endParaRPr lang="en-US" dirty="0"/>
+          </a:p>
+        </p:txBody>
+      </p:sp>
+      <p:sp>
+        <p:nvSpPr>
+          <p:cNvPr id="4" name="Date Placeholder 3"/>
+          <p:cNvSpPr>
+            <a:spLocks noGrp="1"/>
+          </p:cNvSpPr>
+          <p:nvPr>
+            <p:ph type="dt" sz="half" idx="10"/>
+          </p:nvPr>
+        </p:nvSpPr>
+        <p:spPr/>
+        <p:txBody>
+          <a:bodyPr/>
+          <a:lstStyle/>
+          <a:p>
+            <a:pPr>
+              <a:defRPr/>
+            </a:pPr>
+            <a:fld id="{3C43C452-19B2-44FA-B3E2-DA126C1ED564}" type="datetime1">
+              <a:rPr lang="ro-RO" smtClean="0"/>
+              <a:t>04.07.2014</a:t>
+            </a:fld>
+            <a:endParaRPr lang="ro-RO" dirty="0"/>
+          </a:p>
+        </p:txBody>
+      </p:sp>
+      <p:sp>
+        <p:nvSpPr>
+          <p:cNvPr id="5" name="Footer Placeholder 4"/>
+          <p:cNvSpPr>
+            <a:spLocks noGrp="1"/>
+          </p:cNvSpPr>
+          <p:nvPr>
+            <p:ph type="ftr" sz="quarter" idx="11"/>
+          </p:nvPr>
+        </p:nvSpPr>
+        <p:spPr/>
+        <p:txBody>
+          <a:bodyPr/>
+          <a:lstStyle/>
+          <a:p>
+            <a:r>
+              <a:rPr lang="vi-VN" altLang="en-US" smtClean="0"/>
+              <a:t>Sesiunea de Licențe - Iulie 2014</a:t>
+            </a:r>
+            <a:endParaRPr lang="ro-RO" altLang="en-US" dirty="0"/>
+          </a:p>
+        </p:txBody>
+      </p:sp>
+      <p:sp>
+        <p:nvSpPr>
+          <p:cNvPr id="6" name="Slide Number Placeholder 5"/>
+          <p:cNvSpPr>
+            <a:spLocks noGrp="1"/>
+          </p:cNvSpPr>
+          <p:nvPr>
+            <p:ph type="sldNum" sz="quarter" idx="12"/>
+          </p:nvPr>
+        </p:nvSpPr>
+        <p:spPr/>
+        <p:txBody>
+          <a:bodyPr/>
+          <a:lstStyle/>
+          <a:p>
+            <a:pPr>
+              <a:defRPr/>
+            </a:pPr>
+            <a:fld id="{99B47DFE-6EB8-448E-B63B-53036C43F0EB}" type="slidenum">
+              <a:rPr lang="ro-RO" smtClean="0"/>
+              <a:pPr>
+                <a:defRPr/>
+              </a:pPr>
+              <a:t>16</a:t>
+            </a:fld>
+            <a:endParaRPr lang="ro-RO"/>
+          </a:p>
+        </p:txBody>
+      </p:sp>
+    </p:spTree>
+  </p:cSld>
+  <p:clrMapOvr>
+    <a:masterClrMapping/>
+  </p:clrMapOvr>
+</p:sld>
+</file>
+
+<file path=ppt/slides/slide17.xml><?xml version="1.0" encoding="utf-8"?>
+<p:sld xmlns:a="http://schemas.openxmlformats.org/drawingml/2006/main" xmlns:r="http://schemas.openxmlformats.org/officeDocument/2006/relationships" xmlns:p="http://schemas.openxmlformats.org/presentationml/2006/main">
+  <p:cSld>
+    <p:spTree>
+      <p:nvGrpSpPr>
+        <p:cNvPr id="1" name=""/>
+        <p:cNvGrpSpPr/>
+        <p:nvPr/>
+      </p:nvGrpSpPr>
+      <p:grpSpPr>
+        <a:xfrm>
+          <a:off x="0" y="0"/>
+          <a:ext cx="0" cy="0"/>
+          <a:chOff x="0" y="0"/>
+          <a:chExt cx="0" cy="0"/>
+        </a:xfrm>
+      </p:grpSpPr>
+      <p:sp>
+        <p:nvSpPr>
+          <p:cNvPr id="2" name="Title 1"/>
+          <p:cNvSpPr>
+            <a:spLocks noGrp="1"/>
+          </p:cNvSpPr>
+          <p:nvPr>
+            <p:ph type="title"/>
+          </p:nvPr>
+        </p:nvSpPr>
+        <p:spPr/>
+        <p:txBody>
+          <a:bodyPr/>
+          <a:lstStyle/>
+          <a:p>
+            <a:r>
+              <a:rPr lang="ro-RO" dirty="0" smtClean="0"/>
+              <a:t>Sumar</a:t>
+            </a:r>
+            <a:endParaRPr lang="en-US" dirty="0"/>
+          </a:p>
+        </p:txBody>
+      </p:sp>
+      <p:sp>
+        <p:nvSpPr>
+          <p:cNvPr id="3" name="Content Placeholder 2"/>
+          <p:cNvSpPr>
+            <a:spLocks noGrp="1"/>
+          </p:cNvSpPr>
+          <p:nvPr>
+            <p:ph idx="1"/>
+          </p:nvPr>
+        </p:nvSpPr>
+        <p:spPr/>
+        <p:txBody>
+          <a:bodyPr/>
+          <a:lstStyle/>
+          <a:p>
+            <a:r>
+              <a:rPr lang="ro-RO" dirty="0" smtClean="0"/>
+              <a:t>Poziționare în interior</a:t>
+            </a:r>
+          </a:p>
+          <a:p>
+            <a:r>
+              <a:rPr lang="ro-RO" dirty="0" smtClean="0"/>
+              <a:t>Wi-Fi 802.11 Beacons</a:t>
+            </a:r>
+          </a:p>
+          <a:p>
+            <a:r>
+              <a:rPr lang="ro-RO" dirty="0" smtClean="0"/>
+              <a:t>Hartă, off-line phase</a:t>
+            </a:r>
+          </a:p>
+          <a:p>
+            <a:r>
+              <a:rPr lang="ro-RO" dirty="0" smtClean="0"/>
+              <a:t>Aplicație Android</a:t>
+            </a:r>
+          </a:p>
+          <a:p>
+            <a:r>
+              <a:rPr lang="ro-RO" dirty="0" smtClean="0"/>
+              <a:t>Analiză</a:t>
+            </a:r>
+          </a:p>
+          <a:p>
+            <a:r>
+              <a:rPr lang="ro-RO" dirty="0" smtClean="0"/>
+              <a:t>Algoritm</a:t>
+            </a:r>
+            <a:endParaRPr lang="en-US" dirty="0"/>
+          </a:p>
+        </p:txBody>
+      </p:sp>
+      <p:sp>
+        <p:nvSpPr>
+          <p:cNvPr id="4" name="Date Placeholder 3"/>
+          <p:cNvSpPr>
+            <a:spLocks noGrp="1"/>
+          </p:cNvSpPr>
+          <p:nvPr>
+            <p:ph type="dt" sz="half" idx="10"/>
+          </p:nvPr>
+        </p:nvSpPr>
+        <p:spPr/>
+        <p:txBody>
+          <a:bodyPr/>
+          <a:lstStyle/>
+          <a:p>
+            <a:pPr>
+              <a:defRPr/>
+            </a:pPr>
+            <a:fld id="{723CA873-3469-45F3-8579-5796BD1C5C56}" type="datetime1">
+              <a:rPr lang="ro-RO" smtClean="0"/>
+              <a:t>04.07.2014</a:t>
+            </a:fld>
+            <a:endParaRPr lang="ro-RO" dirty="0"/>
+          </a:p>
+        </p:txBody>
+      </p:sp>
+      <p:sp>
+        <p:nvSpPr>
+          <p:cNvPr id="5" name="Footer Placeholder 4"/>
+          <p:cNvSpPr>
+            <a:spLocks noGrp="1"/>
+          </p:cNvSpPr>
+          <p:nvPr>
+            <p:ph type="ftr" sz="quarter" idx="11"/>
+          </p:nvPr>
+        </p:nvSpPr>
+        <p:spPr/>
+        <p:txBody>
+          <a:bodyPr/>
+          <a:lstStyle/>
+          <a:p>
+            <a:r>
+              <a:rPr lang="vi-VN" altLang="en-US" smtClean="0"/>
+              <a:t>Sesiunea de Licențe - Iulie 2014</a:t>
+            </a:r>
+            <a:endParaRPr lang="ro-RO" altLang="en-US" dirty="0"/>
+          </a:p>
+        </p:txBody>
+      </p:sp>
+      <p:sp>
+        <p:nvSpPr>
+          <p:cNvPr id="6" name="Slide Number Placeholder 5"/>
+          <p:cNvSpPr>
+            <a:spLocks noGrp="1"/>
+          </p:cNvSpPr>
+          <p:nvPr>
+            <p:ph type="sldNum" sz="quarter" idx="12"/>
+          </p:nvPr>
+        </p:nvSpPr>
+        <p:spPr/>
+        <p:txBody>
+          <a:bodyPr/>
+          <a:lstStyle/>
+          <a:p>
+            <a:pPr>
+              <a:defRPr/>
+            </a:pPr>
+            <a:fld id="{99B47DFE-6EB8-448E-B63B-53036C43F0EB}" type="slidenum">
+              <a:rPr lang="ro-RO" smtClean="0"/>
+              <a:pPr>
+                <a:defRPr/>
+              </a:pPr>
+              <a:t>17</a:t>
             </a:fld>
             <a:endParaRPr lang="ro-RO"/>
           </a:p>
@@ -6359,17 +7345,8 @@
             </a:pPr>
             <a:r>
               <a:rPr lang="ro-RO" dirty="0" smtClean="0"/>
-              <a:t>	Oamenii </a:t>
-            </a:r>
-            <a:r>
-              <a:rPr lang="ro-RO" dirty="0" smtClean="0"/>
-              <a:t>își petrec 80% din </a:t>
-            </a:r>
-            <a:r>
-              <a:rPr lang="ro-RO" dirty="0" smtClean="0"/>
-              <a:t>timp</a:t>
-            </a:r>
-            <a:endParaRPr lang="ro-RO" dirty="0" smtClean="0"/>
+              <a:t>	Oamenii își petrec 80% din timp</a:t>
+            </a:r>
           </a:p>
           <a:p>
             <a:pPr>
@@ -6377,11 +7354,7 @@
             </a:pPr>
             <a:r>
               <a:rPr lang="ro-RO" dirty="0" smtClean="0"/>
-              <a:t>	în </a:t>
-            </a:r>
-            <a:r>
-              <a:rPr lang="ro-RO" dirty="0" smtClean="0"/>
-              <a:t>interior</a:t>
+              <a:t>	în interior</a:t>
             </a:r>
           </a:p>
           <a:p>
@@ -6455,10 +7428,10 @@
             <a:pPr>
               <a:defRPr/>
             </a:pPr>
-            <a:r>
-              <a:rPr lang="ro-RO" dirty="0" smtClean="0"/>
-              <a:t>16.05.2014</a:t>
-            </a:r>
+            <a:fld id="{FF469AF9-2C28-4B5F-84C3-65EDD1F0535D}" type="datetime1">
+              <a:rPr lang="ro-RO" smtClean="0"/>
+              <a:t>04.07.2014</a:t>
+            </a:fld>
             <a:endParaRPr lang="ro-RO" dirty="0"/>
           </a:p>
         </p:txBody>
@@ -6478,16 +7451,11 @@
           <a:bodyPr/>
           <a:lstStyle/>
           <a:p>
-            <a:pPr>
-              <a:defRPr/>
-            </a:pPr>
-            <a:r>
-              <a:rPr lang="vi-VN" dirty="0" smtClean="0"/>
-              <a:t>Sesiunea de Comunicări Științifice Studențești - Mai 2014</a:t>
-            </a:r>
-            <a:endParaRPr lang="ro-RO" dirty="0">
-              <a:latin typeface="Arial" charset="0"/>
-            </a:endParaRPr>
+            <a:r>
+              <a:rPr lang="vi-VN" altLang="en-US" smtClean="0"/>
+              <a:t>Sesiunea de Licențe - Iulie 2014</a:t>
+            </a:r>
+            <a:endParaRPr lang="ro-RO" altLang="en-US" dirty="0"/>
           </a:p>
         </p:txBody>
       </p:sp>
@@ -6604,7 +7572,7 @@
       </p:grpSpPr>
       <p:sp>
         <p:nvSpPr>
-          <p:cNvPr id="13314" name="Title 1"/>
+          <p:cNvPr id="2" name="Title 1"/>
           <p:cNvSpPr>
             <a:spLocks noGrp="1"/>
           </p:cNvSpPr>
@@ -6612,27 +7580,22 @@
             <p:ph type="title"/>
           </p:nvPr>
         </p:nvSpPr>
-        <p:spPr>
-          <a:xfrm>
-            <a:off x="1214438" y="131763"/>
-            <a:ext cx="7472362" cy="868362"/>
-          </a:xfrm>
-        </p:spPr>
-        <p:txBody>
-          <a:bodyPr/>
-          <a:lstStyle/>
-          <a:p>
-            <a:pPr eaLnBrk="1" hangingPunct="1"/>
+        <p:spPr/>
+        <p:txBody>
+          <a:bodyPr/>
+          <a:lstStyle/>
+          <a:p>
             <a:r>
               <a:rPr lang="ro-RO" dirty="0" smtClean="0"/>
-              <a:t>Unde?</a:t>
-            </a:r>
-          </a:p>
-        </p:txBody>
-      </p:sp>
-      <p:sp>
-        <p:nvSpPr>
-          <p:cNvPr id="13315" name="Content Placeholder 2"/>
+              <a:t>Cum?</a:t>
+            </a:r>
+            <a:endParaRPr lang="en-US" dirty="0"/>
+          </a:p>
+        </p:txBody>
+      </p:sp>
+      <p:sp>
+        <p:nvSpPr>
+          <p:cNvPr id="3" name="Content Placeholder 2"/>
           <p:cNvSpPr>
             <a:spLocks noGrp="1"/>
           </p:cNvSpPr>
@@ -6640,49 +7603,96 @@
             <p:ph idx="1"/>
           </p:nvPr>
         </p:nvSpPr>
-        <p:spPr>
-          <a:xfrm>
-            <a:off x="457200" y="1214438"/>
-            <a:ext cx="8229600" cy="4929187"/>
-          </a:xfrm>
-        </p:spPr>
-        <p:txBody>
-          <a:bodyPr/>
-          <a:lstStyle/>
-          <a:p>
-            <a:pPr eaLnBrk="1" hangingPunct="1"/>
+        <p:spPr/>
+        <p:txBody>
+          <a:bodyPr/>
+          <a:lstStyle/>
+          <a:p>
             <a:r>
               <a:rPr lang="ro-RO" dirty="0" smtClean="0"/>
-              <a:t>Transport: aeroport, metrou, gară</a:t>
-            </a:r>
-          </a:p>
-          <a:p>
-            <a:pPr eaLnBrk="1" hangingPunct="1"/>
+              <a:t>Outdoors: GPS</a:t>
+            </a:r>
+          </a:p>
+          <a:p>
             <a:r>
               <a:rPr lang="ro-RO" dirty="0" smtClean="0"/>
-              <a:t>Social: mall, supermarket</a:t>
-            </a:r>
-          </a:p>
-          <a:p>
-            <a:pPr eaLnBrk="1" hangingPunct="1"/>
+              <a:t>Indoors: sistem RF</a:t>
+            </a:r>
+          </a:p>
+          <a:p>
+            <a:pPr lvl="1"/>
             <a:r>
               <a:rPr lang="ro-RO" dirty="0" smtClean="0"/>
-              <a:t>Turism: muzee, hoteluri</a:t>
-            </a:r>
-          </a:p>
-          <a:p>
-            <a:pPr eaLnBrk="1" hangingPunct="1"/>
+              <a:t>Bluetooth Low Energy</a:t>
+            </a:r>
+          </a:p>
+          <a:p>
+            <a:pPr lvl="2"/>
             <a:r>
               <a:rPr lang="ro-RO" dirty="0" smtClean="0"/>
-              <a:t>Instituții: spitale, primării, direcții generale taxe și impozite </a:t>
-            </a:r>
-            <a:r>
-              <a:rPr lang="ro-RO" dirty="0" smtClean="0">
-                <a:sym typeface="Wingdings" pitchFamily="2" charset="2"/>
-              </a:rPr>
-              <a:t></a:t>
-            </a:r>
-            <a:endParaRPr lang="ro-RO" dirty="0" smtClean="0"/>
+              <a:t>Apple iBeacon</a:t>
+            </a:r>
+          </a:p>
+          <a:p>
+            <a:pPr lvl="1"/>
+            <a:r>
+              <a:rPr lang="ro-RO" dirty="0" smtClean="0"/>
+              <a:t>RFID, QR code</a:t>
+            </a:r>
+          </a:p>
+          <a:p>
+            <a:pPr lvl="1"/>
+            <a:r>
+              <a:rPr lang="ro-RO" dirty="0" smtClean="0"/>
+              <a:t>NFC</a:t>
+            </a:r>
+          </a:p>
+          <a:p>
+            <a:pPr lvl="1"/>
+            <a:r>
+              <a:rPr lang="ro-RO" dirty="0" smtClean="0"/>
+              <a:t>GSM localization</a:t>
+            </a:r>
+          </a:p>
+          <a:p>
+            <a:pPr lvl="1"/>
+            <a:r>
+              <a:rPr lang="ro-RO" b="1" dirty="0" smtClean="0"/>
+              <a:t>Wi-Fi fingerprinting</a:t>
+            </a:r>
+          </a:p>
+          <a:p>
+            <a:pPr lvl="2"/>
+            <a:r>
+              <a:rPr lang="ro-RO" dirty="0" smtClean="0"/>
+              <a:t>Google, Navizon</a:t>
+            </a:r>
+          </a:p>
+        </p:txBody>
+      </p:sp>
+      <p:sp>
+        <p:nvSpPr>
+          <p:cNvPr id="4" name="Date Placeholder 3"/>
+          <p:cNvSpPr>
+            <a:spLocks noGrp="1"/>
+          </p:cNvSpPr>
+          <p:nvPr>
+            <p:ph type="dt" sz="half" idx="10"/>
+          </p:nvPr>
+        </p:nvSpPr>
+        <p:spPr/>
+        <p:txBody>
+          <a:bodyPr/>
+          <a:lstStyle/>
+          <a:p>
+            <a:pPr>
+              <a:defRPr/>
+            </a:pPr>
+            <a:fld id="{020C9754-1EED-47DB-BD4E-17FC714A8CBB}" type="datetime1">
+              <a:rPr lang="ro-RO" smtClean="0"/>
+              <a:t>04.07.2014</a:t>
+            </a:fld>
+            <a:endParaRPr lang="ro-RO" dirty="0"/>
           </a:p>
         </p:txBody>
       </p:sp>
@@ -6701,29 +7711,17 @@
           <a:bodyPr/>
           <a:lstStyle/>
           <a:p>
-            <a:pPr eaLnBrk="1" hangingPunct="1"/>
-            <a:r>
-              <a:rPr lang="en-US" dirty="0" err="1" smtClean="0"/>
-              <a:t>Sesiunea</a:t>
-            </a:r>
-            <a:r>
-              <a:rPr lang="en-US" dirty="0" smtClean="0"/>
-              <a:t> de </a:t>
-            </a:r>
-            <a:r>
-              <a:rPr lang="en-US" dirty="0" err="1" smtClean="0"/>
-              <a:t>Comunic</a:t>
-            </a:r>
-            <a:r>
-              <a:rPr lang="ro-RO" dirty="0" smtClean="0"/>
-              <a:t>ări Științifice Studențești -  Mai 2014</a:t>
-            </a:r>
-          </a:p>
-        </p:txBody>
-      </p:sp>
-      <p:sp>
-        <p:nvSpPr>
-          <p:cNvPr id="4" name="Slide Number Placeholder 3"/>
+            <a:r>
+              <a:rPr lang="vi-VN" altLang="en-US" smtClean="0"/>
+              <a:t>Sesiunea de Licențe - Iulie 2014</a:t>
+            </a:r>
+            <a:endParaRPr lang="ro-RO" altLang="en-US" dirty="0"/>
+          </a:p>
+        </p:txBody>
+      </p:sp>
+      <p:sp>
+        <p:nvSpPr>
+          <p:cNvPr id="6" name="Slide Number Placeholder 5"/>
           <p:cNvSpPr>
             <a:spLocks noGrp="1"/>
           </p:cNvSpPr>
@@ -6739,8 +7737,8 @@
             <a:pPr>
               <a:defRPr/>
             </a:pPr>
-            <a:fld id="{BD5DE285-E937-41C3-A983-75A13211425E}" type="slidenum">
-              <a:rPr lang="ro-RO"/>
+            <a:fld id="{99B47DFE-6EB8-448E-B63B-53036C43F0EB}" type="slidenum">
+              <a:rPr lang="ro-RO" smtClean="0"/>
               <a:pPr>
                 <a:defRPr/>
               </a:pPr>
@@ -6750,44 +7748,11 @@
           </a:p>
         </p:txBody>
       </p:sp>
-      <p:sp>
-        <p:nvSpPr>
-          <p:cNvPr id="7" name="Date Placeholder 6"/>
-          <p:cNvSpPr>
-            <a:spLocks noGrp="1"/>
-          </p:cNvSpPr>
-          <p:nvPr>
-            <p:ph type="dt" sz="half" idx="10"/>
-          </p:nvPr>
-        </p:nvSpPr>
-        <p:spPr/>
-        <p:txBody>
-          <a:bodyPr/>
-          <a:lstStyle/>
-          <a:p>
-            <a:pPr>
-              <a:defRPr/>
-            </a:pPr>
-            <a:r>
-              <a:rPr lang="ro-RO" dirty="0" smtClean="0"/>
-              <a:t>16.05.2014</a:t>
-            </a:r>
-            <a:endParaRPr lang="ro-RO" dirty="0"/>
-          </a:p>
-        </p:txBody>
-      </p:sp>
     </p:spTree>
   </p:cSld>
   <p:clrMapOvr>
     <a:masterClrMapping/>
   </p:clrMapOvr>
-  <p:timing>
-    <p:tnLst>
-      <p:par>
-        <p:cTn id="1" dur="indefinite" restart="never" nodeType="tmRoot"/>
-      </p:par>
-    </p:tnLst>
-  </p:timing>
 </p:sld>
 </file>
 
@@ -6825,7 +7790,7 @@
           <a:p>
             <a:r>
               <a:rPr lang="ro-RO" dirty="0" smtClean="0"/>
-              <a:t>Cum?</a:t>
+              <a:t>Wi-Fi fingerprinting</a:t>
             </a:r>
             <a:endParaRPr lang="en-US" dirty="0"/>
           </a:p>
@@ -6848,62 +7813,33 @@
           <a:p>
             <a:r>
               <a:rPr lang="ro-RO" dirty="0" smtClean="0"/>
-              <a:t>Outdoors: GPS</a:t>
+              <a:t>Mediul 802.11 foarte răspândit, nu necesită costuri suplimentare</a:t>
             </a:r>
           </a:p>
           <a:p>
             <a:r>
               <a:rPr lang="ro-RO" dirty="0" smtClean="0"/>
-              <a:t>Indoors: sistem RF</a:t>
+              <a:t>AP-urile trimit periodic beaconuri</a:t>
+            </a:r>
+          </a:p>
+          <a:p>
+            <a:r>
+              <a:rPr lang="ro-RO" dirty="0" smtClean="0"/>
+              <a:t>Informații relevante</a:t>
             </a:r>
           </a:p>
           <a:p>
             <a:pPr lvl="1"/>
             <a:r>
               <a:rPr lang="ro-RO" dirty="0" smtClean="0"/>
-              <a:t>Bluetooth Low Energy</a:t>
-            </a:r>
-          </a:p>
-          <a:p>
-            <a:pPr lvl="2"/>
+              <a:t>RSSI – puterea semnalului; indicator al distanței față de AP</a:t>
+            </a:r>
+          </a:p>
+          <a:p>
+            <a:pPr lvl="1"/>
             <a:r>
               <a:rPr lang="ro-RO" dirty="0" smtClean="0"/>
-              <a:t>Apple iBeacon</a:t>
-            </a:r>
-          </a:p>
-          <a:p>
-            <a:pPr lvl="1"/>
-            <a:r>
-              <a:rPr lang="ro-RO" dirty="0" smtClean="0"/>
-              <a:t>RFID, QR code</a:t>
-            </a:r>
-          </a:p>
-          <a:p>
-            <a:pPr lvl="1"/>
-            <a:r>
-              <a:rPr lang="ro-RO" dirty="0" smtClean="0"/>
-              <a:t>NFC</a:t>
-            </a:r>
-          </a:p>
-          <a:p>
-            <a:pPr lvl="1"/>
-            <a:r>
-              <a:rPr lang="ro-RO" dirty="0" smtClean="0"/>
-              <a:t>GSM localization</a:t>
-            </a:r>
-          </a:p>
-          <a:p>
-            <a:pPr lvl="1"/>
-            <a:r>
-              <a:rPr lang="ro-RO" b="1" dirty="0" smtClean="0"/>
-              <a:t>Wi-Fi fingerprinting</a:t>
-            </a:r>
-          </a:p>
-          <a:p>
-            <a:pPr lvl="2"/>
-            <a:r>
-              <a:rPr lang="ro-RO" dirty="0" smtClean="0"/>
-              <a:t>Google, Navizon</a:t>
+              <a:t>BSSID – adresa MAC, unică</a:t>
             </a:r>
           </a:p>
         </p:txBody>
@@ -6926,10 +7862,10 @@
             <a:pPr>
               <a:defRPr/>
             </a:pPr>
-            <a:r>
-              <a:rPr lang="ro-RO" dirty="0" smtClean="0"/>
-              <a:t>16.05.2014</a:t>
-            </a:r>
+            <a:fld id="{E383E94F-3A41-4370-BC5F-1FFDFD255AB3}" type="datetime1">
+              <a:rPr lang="ro-RO" smtClean="0"/>
+              <a:t>04.07.2014</a:t>
+            </a:fld>
             <a:endParaRPr lang="ro-RO" dirty="0"/>
           </a:p>
         </p:txBody>
@@ -6949,16 +7885,11 @@
           <a:bodyPr/>
           <a:lstStyle/>
           <a:p>
-            <a:pPr>
-              <a:defRPr/>
-            </a:pPr>
-            <a:r>
-              <a:rPr lang="vi-VN" dirty="0" smtClean="0"/>
-              <a:t>Sesiunea de Comunicări Științifice Studențești - Mai 2014</a:t>
-            </a:r>
-            <a:endParaRPr lang="ro-RO" dirty="0">
-              <a:latin typeface="Arial" charset="0"/>
-            </a:endParaRPr>
+            <a:r>
+              <a:rPr lang="vi-VN" altLang="en-US" smtClean="0"/>
+              <a:t>Sesiunea de Licențe - Iulie 2014</a:t>
+            </a:r>
+            <a:endParaRPr lang="ro-RO" altLang="en-US" dirty="0"/>
           </a:p>
         </p:txBody>
       </p:sp>
@@ -7033,60 +7964,35 @@
           <a:p>
             <a:r>
               <a:rPr lang="ro-RO" dirty="0" smtClean="0"/>
-              <a:t>Wi-Fi fingerprinting</a:t>
+              <a:t>Beacon</a:t>
             </a:r>
             <a:endParaRPr lang="en-US" dirty="0"/>
           </a:p>
         </p:txBody>
       </p:sp>
-      <p:sp>
-        <p:nvSpPr>
-          <p:cNvPr id="3" name="Content Placeholder 2"/>
-          <p:cNvSpPr>
-            <a:spLocks noGrp="1"/>
-          </p:cNvSpPr>
+      <p:pic>
+        <p:nvPicPr>
+          <p:cNvPr id="7" name="Content Placeholder 6" descr="Fig3.png"/>
+          <p:cNvPicPr>
+            <a:picLocks noGrp="1" noChangeAspect="1"/>
+          </p:cNvPicPr>
           <p:nvPr>
             <p:ph idx="1"/>
           </p:nvPr>
-        </p:nvSpPr>
-        <p:spPr/>
-        <p:txBody>
-          <a:bodyPr/>
-          <a:lstStyle/>
-          <a:p>
-            <a:r>
-              <a:rPr lang="ro-RO" dirty="0" smtClean="0"/>
-              <a:t>Mediul 802.11 foarte răspândit, nu necesită costuri suplimentare</a:t>
-            </a:r>
-          </a:p>
-          <a:p>
-            <a:r>
-              <a:rPr lang="ro-RO" dirty="0" smtClean="0"/>
-              <a:t>AP-urile trimit periodic beaconuri</a:t>
-            </a:r>
-          </a:p>
-          <a:p>
-            <a:r>
-              <a:rPr lang="ro-RO" dirty="0" smtClean="0"/>
-              <a:t>Informații relevante</a:t>
-            </a:r>
-          </a:p>
-          <a:p>
-            <a:pPr lvl="1"/>
-            <a:r>
-              <a:rPr lang="ro-RO" dirty="0" smtClean="0"/>
-              <a:t>RSSI – puterea semnalului; indicator al distanței față de AP</a:t>
-            </a:r>
-          </a:p>
-          <a:p>
-            <a:pPr lvl="1"/>
-            <a:r>
-              <a:rPr lang="ro-RO" dirty="0" smtClean="0"/>
-              <a:t>BSSID – adresa MAC, unică</a:t>
-            </a:r>
-          </a:p>
-        </p:txBody>
-      </p:sp>
+        </p:nvPicPr>
+        <p:blipFill>
+          <a:blip r:embed="rId2"/>
+          <a:stretch>
+            <a:fillRect/>
+          </a:stretch>
+        </p:blipFill>
+        <p:spPr>
+          <a:xfrm>
+            <a:off x="564237" y="1449673"/>
+            <a:ext cx="8015526" cy="4458716"/>
+          </a:xfrm>
+        </p:spPr>
+      </p:pic>
       <p:sp>
         <p:nvSpPr>
           <p:cNvPr id="4" name="Date Placeholder 3"/>
@@ -7105,10 +8011,10 @@
             <a:pPr>
               <a:defRPr/>
             </a:pPr>
-            <a:r>
-              <a:rPr lang="ro-RO" dirty="0" smtClean="0"/>
-              <a:t>16.05.2014</a:t>
-            </a:r>
+            <a:fld id="{77AB1ED1-9A0F-4C7C-AC08-C7979F7BB0EE}" type="datetime1">
+              <a:rPr lang="ro-RO" smtClean="0"/>
+              <a:t>04.07.2014</a:t>
+            </a:fld>
             <a:endParaRPr lang="ro-RO" dirty="0"/>
           </a:p>
         </p:txBody>
@@ -7128,16 +8034,11 @@
           <a:bodyPr/>
           <a:lstStyle/>
           <a:p>
-            <a:pPr>
-              <a:defRPr/>
-            </a:pPr>
-            <a:r>
-              <a:rPr lang="vi-VN" dirty="0" smtClean="0"/>
-              <a:t>Sesiunea de Comunicări Științifice Studențești - Mai 2014</a:t>
-            </a:r>
-            <a:endParaRPr lang="ro-RO" dirty="0">
-              <a:latin typeface="Arial" charset="0"/>
-            </a:endParaRPr>
+            <a:r>
+              <a:rPr lang="vi-VN" altLang="en-US" smtClean="0"/>
+              <a:t>Sesiunea de Licențe - Iulie 2014</a:t>
+            </a:r>
+            <a:endParaRPr lang="ro-RO" altLang="en-US" dirty="0"/>
           </a:p>
         </p:txBody>
       </p:sp>
@@ -7167,6 +8068,50 @@
               <a:t>5</a:t>
             </a:fld>
             <a:endParaRPr lang="ro-RO"/>
+          </a:p>
+        </p:txBody>
+      </p:sp>
+      <p:sp>
+        <p:nvSpPr>
+          <p:cNvPr id="10" name="Frame 9"/>
+          <p:cNvSpPr/>
+          <p:nvPr/>
+        </p:nvSpPr>
+        <p:spPr>
+          <a:xfrm>
+            <a:off x="785786" y="4143380"/>
+            <a:ext cx="2357454" cy="500066"/>
+          </a:xfrm>
+          <a:prstGeom prst="frame">
+            <a:avLst/>
+          </a:prstGeom>
+        </p:spPr>
+        <p:style>
+          <a:lnRef idx="2">
+            <a:schemeClr val="accent1">
+              <a:shade val="50000"/>
+            </a:schemeClr>
+          </a:lnRef>
+          <a:fillRef idx="1">
+            <a:schemeClr val="accent1"/>
+          </a:fillRef>
+          <a:effectRef idx="0">
+            <a:schemeClr val="accent1"/>
+          </a:effectRef>
+          <a:fontRef idx="minor">
+            <a:schemeClr val="lt1"/>
+          </a:fontRef>
+        </p:style>
+        <p:txBody>
+          <a:bodyPr rtlCol="0" anchor="ctr"/>
+          <a:lstStyle/>
+          <a:p>
+            <a:pPr algn="ctr"/>
+            <a:endParaRPr lang="en-US">
+              <a:solidFill>
+                <a:schemeClr val="tx1"/>
+              </a:solidFill>
+            </a:endParaRPr>
           </a:p>
         </p:txBody>
       </p:sp>
@@ -7212,35 +8157,78 @@
           <a:p>
             <a:r>
               <a:rPr lang="ro-RO" dirty="0" smtClean="0"/>
-              <a:t>Beacon</a:t>
+              <a:t>Descrierea metodei</a:t>
             </a:r>
             <a:endParaRPr lang="en-US" dirty="0"/>
           </a:p>
         </p:txBody>
       </p:sp>
-      <p:pic>
-        <p:nvPicPr>
-          <p:cNvPr id="7" name="Content Placeholder 6" descr="Fig3.png"/>
-          <p:cNvPicPr>
-            <a:picLocks noGrp="1" noChangeAspect="1"/>
-          </p:cNvPicPr>
+      <p:sp>
+        <p:nvSpPr>
+          <p:cNvPr id="3" name="Content Placeholder 2"/>
+          <p:cNvSpPr>
+            <a:spLocks noGrp="1"/>
+          </p:cNvSpPr>
           <p:nvPr>
             <p:ph idx="1"/>
           </p:nvPr>
-        </p:nvPicPr>
-        <p:blipFill>
-          <a:blip r:embed="rId2"/>
-          <a:stretch>
-            <a:fillRect/>
-          </a:stretch>
-        </p:blipFill>
-        <p:spPr>
-          <a:xfrm>
-            <a:off x="564237" y="1449673"/>
-            <a:ext cx="8015526" cy="4458716"/>
-          </a:xfrm>
-        </p:spPr>
-      </p:pic>
+        </p:nvSpPr>
+        <p:spPr/>
+        <p:txBody>
+          <a:bodyPr/>
+          <a:lstStyle/>
+          <a:p>
+            <a:r>
+              <a:rPr lang="ro-RO" dirty="0" smtClean="0"/>
+              <a:t>Necesar: planul unei încăperi</a:t>
+            </a:r>
+          </a:p>
+          <a:p>
+            <a:r>
+              <a:rPr lang="ro-RO" dirty="0" smtClean="0"/>
+              <a:t>Off-line phase: colectarea RSSI pentru fiecare BSSID în multiple puncte din încăpere</a:t>
+            </a:r>
+          </a:p>
+          <a:p>
+            <a:r>
+              <a:rPr lang="ro-RO" dirty="0" smtClean="0"/>
+              <a:t>Analiză:</a:t>
+            </a:r>
+          </a:p>
+          <a:p>
+            <a:pPr lvl="1"/>
+            <a:r>
+              <a:rPr lang="ro-RO" dirty="0" smtClean="0"/>
+              <a:t>Există suficiente AP-uri?</a:t>
+            </a:r>
+          </a:p>
+          <a:p>
+            <a:pPr lvl="1"/>
+            <a:r>
+              <a:rPr lang="ro-RO" dirty="0" smtClean="0"/>
+              <a:t>Este toată încăperea acoperită de semnal?</a:t>
+            </a:r>
+          </a:p>
+          <a:p>
+            <a:pPr lvl="1"/>
+            <a:r>
+              <a:rPr lang="ro-RO" dirty="0" smtClean="0"/>
+              <a:t>Curba semnalului, interferențe</a:t>
+            </a:r>
+          </a:p>
+          <a:p>
+            <a:r>
+              <a:rPr lang="ro-RO" dirty="0" smtClean="0"/>
+              <a:t>On-line phase: răspunde la întrebarea </a:t>
+            </a:r>
+            <a:r>
+              <a:rPr lang="ro-RO" i="1" dirty="0" smtClean="0"/>
+              <a:t>Unde mă aflu?</a:t>
+            </a:r>
+            <a:endParaRPr lang="en-US" i="1" dirty="0"/>
+          </a:p>
+        </p:txBody>
+      </p:sp>
       <p:sp>
         <p:nvSpPr>
           <p:cNvPr id="4" name="Date Placeholder 3"/>
@@ -7259,10 +8247,10 @@
             <a:pPr>
               <a:defRPr/>
             </a:pPr>
-            <a:r>
-              <a:rPr lang="ro-RO" dirty="0" smtClean="0"/>
-              <a:t>16.05.2014</a:t>
-            </a:r>
+            <a:fld id="{D3FA1650-659F-402F-AB7B-BA44E0B36DA3}" type="datetime1">
+              <a:rPr lang="ro-RO" smtClean="0"/>
+              <a:t>04.07.2014</a:t>
+            </a:fld>
             <a:endParaRPr lang="ro-RO" dirty="0"/>
           </a:p>
         </p:txBody>
@@ -7282,16 +8270,11 @@
           <a:bodyPr/>
           <a:lstStyle/>
           <a:p>
-            <a:pPr>
-              <a:defRPr/>
-            </a:pPr>
-            <a:r>
-              <a:rPr lang="vi-VN" dirty="0" smtClean="0"/>
-              <a:t>Sesiunea de Comunicări Științifice Studențești -  Mai 2014</a:t>
-            </a:r>
-            <a:endParaRPr lang="ro-RO" dirty="0">
-              <a:latin typeface="Arial" charset="0"/>
-            </a:endParaRPr>
+            <a:r>
+              <a:rPr lang="vi-VN" altLang="en-US" smtClean="0"/>
+              <a:t>Sesiunea de Licențe - Iulie 2014</a:t>
+            </a:r>
+            <a:endParaRPr lang="ro-RO" altLang="en-US" dirty="0"/>
           </a:p>
         </p:txBody>
       </p:sp>
@@ -7321,50 +8304,6 @@
               <a:t>6</a:t>
             </a:fld>
             <a:endParaRPr lang="ro-RO"/>
-          </a:p>
-        </p:txBody>
-      </p:sp>
-      <p:sp>
-        <p:nvSpPr>
-          <p:cNvPr id="10" name="Frame 9"/>
-          <p:cNvSpPr/>
-          <p:nvPr/>
-        </p:nvSpPr>
-        <p:spPr>
-          <a:xfrm>
-            <a:off x="785786" y="4143380"/>
-            <a:ext cx="2357454" cy="500066"/>
-          </a:xfrm>
-          <a:prstGeom prst="frame">
-            <a:avLst/>
-          </a:prstGeom>
-        </p:spPr>
-        <p:style>
-          <a:lnRef idx="2">
-            <a:schemeClr val="accent1">
-              <a:shade val="50000"/>
-            </a:schemeClr>
-          </a:lnRef>
-          <a:fillRef idx="1">
-            <a:schemeClr val="accent1"/>
-          </a:fillRef>
-          <a:effectRef idx="0">
-            <a:schemeClr val="accent1"/>
-          </a:effectRef>
-          <a:fontRef idx="minor">
-            <a:schemeClr val="lt1"/>
-          </a:fontRef>
-        </p:style>
-        <p:txBody>
-          <a:bodyPr rtlCol="0" anchor="ctr"/>
-          <a:lstStyle/>
-          <a:p>
-            <a:pPr algn="ctr"/>
-            <a:endParaRPr lang="en-US">
-              <a:solidFill>
-                <a:schemeClr val="tx1"/>
-              </a:solidFill>
-            </a:endParaRPr>
           </a:p>
         </p:txBody>
       </p:sp>
@@ -7410,7 +8349,7 @@
           <a:p>
             <a:r>
               <a:rPr lang="ro-RO" dirty="0" smtClean="0"/>
-              <a:t>RADAR</a:t>
+              <a:t>TODO</a:t>
             </a:r>
             <a:endParaRPr lang="en-US" dirty="0"/>
           </a:p>
@@ -7432,53 +8371,154 @@
           <a:lstStyle/>
           <a:p>
             <a:r>
-              <a:rPr lang="ro-RO" dirty="0" smtClean="0"/>
-              <a:t>Necesar: planul unei încăperi</a:t>
-            </a:r>
-          </a:p>
-          <a:p>
-            <a:r>
-              <a:rPr lang="ro-RO" dirty="0" smtClean="0"/>
-              <a:t>Off-line phase: colectarea RSSI pentru fiecare BSSID în multiple puncte din încăpere</a:t>
-            </a:r>
-          </a:p>
-          <a:p>
-            <a:r>
-              <a:rPr lang="ro-RO" dirty="0" smtClean="0"/>
-              <a:t>Analiză:</a:t>
-            </a:r>
-          </a:p>
-          <a:p>
-            <a:pPr lvl="1"/>
-            <a:r>
-              <a:rPr lang="ro-RO" dirty="0" smtClean="0"/>
-              <a:t>Există suficiente AP-uri?</a:t>
-            </a:r>
-          </a:p>
-          <a:p>
-            <a:pPr lvl="1"/>
-            <a:r>
-              <a:rPr lang="ro-RO" dirty="0" smtClean="0"/>
-              <a:t>Este toată încăperea acoperită de semnal?</a:t>
-            </a:r>
-          </a:p>
-          <a:p>
-            <a:pPr lvl="1"/>
-            <a:r>
-              <a:rPr lang="ro-RO" dirty="0" smtClean="0"/>
-              <a:t>Curba semnalului, interferențe</a:t>
-            </a:r>
-          </a:p>
-          <a:p>
-            <a:r>
-              <a:rPr lang="ro-RO" dirty="0" smtClean="0"/>
-              <a:t>On-line phase: răspunde la întrebarea </a:t>
-            </a:r>
-            <a:r>
-              <a:rPr lang="ro-RO" i="1" dirty="0" smtClean="0"/>
-              <a:t>Unde mă aflu?</a:t>
-            </a:r>
-            <a:endParaRPr lang="en-US" i="1" dirty="0"/>
+              <a:rPr lang="en-US" dirty="0" err="1"/>
+              <a:t>aș</a:t>
+            </a:r>
+            <a:r>
+              <a:rPr lang="en-US" dirty="0"/>
+              <a:t> </a:t>
+            </a:r>
+            <a:r>
+              <a:rPr lang="en-US" dirty="0" err="1"/>
+              <a:t>adăuga</a:t>
+            </a:r>
+            <a:r>
+              <a:rPr lang="en-US" dirty="0"/>
+              <a:t> un slide </a:t>
+            </a:r>
+            <a:r>
+              <a:rPr lang="en-US" dirty="0" err="1"/>
+              <a:t>după</a:t>
+            </a:r>
+            <a:r>
+              <a:rPr lang="en-US" dirty="0"/>
+              <a:t> 8, cu </a:t>
+            </a:r>
+            <a:r>
+              <a:rPr lang="en-US" dirty="0" err="1"/>
+              <a:t>tabele</a:t>
+            </a:r>
+            <a:r>
+              <a:rPr lang="en-US" dirty="0"/>
+              <a:t> </a:t>
+            </a:r>
+            <a:r>
+              <a:rPr lang="en-US" dirty="0" err="1"/>
+              <a:t>și</a:t>
+            </a:r>
+            <a:r>
+              <a:rPr lang="en-US" dirty="0"/>
+              <a:t> </a:t>
+            </a:r>
+            <a:r>
+              <a:rPr lang="en-US" dirty="0" err="1"/>
+              <a:t>desene</a:t>
+            </a:r>
+            <a:r>
+              <a:rPr lang="en-US" dirty="0"/>
+              <a:t> care </a:t>
+            </a:r>
+            <a:r>
+              <a:rPr lang="en-US" dirty="0" err="1"/>
+              <a:t>să</a:t>
+            </a:r>
+            <a:r>
+              <a:rPr lang="en-US" dirty="0"/>
+              <a:t> </a:t>
+            </a:r>
+            <a:r>
+              <a:rPr lang="en-US" dirty="0" err="1"/>
+              <a:t>explice</a:t>
+            </a:r>
+            <a:r>
+              <a:rPr lang="en-US" dirty="0"/>
+              <a:t> </a:t>
+            </a:r>
+            <a:r>
+              <a:rPr lang="en-US" dirty="0" err="1"/>
+              <a:t>mai</a:t>
+            </a:r>
+            <a:r>
+              <a:rPr lang="en-US" dirty="0"/>
+              <a:t> bine </a:t>
+            </a:r>
+            <a:r>
+              <a:rPr lang="en-US" dirty="0" err="1"/>
+              <a:t>fazele</a:t>
+            </a:r>
+            <a:r>
+              <a:rPr lang="en-US" dirty="0"/>
+              <a:t>. Ce </a:t>
+            </a:r>
+            <a:r>
+              <a:rPr lang="en-US" dirty="0" err="1"/>
+              <a:t>zici</a:t>
+            </a:r>
+            <a:r>
+              <a:rPr lang="en-US" dirty="0"/>
+              <a:t> la "offline phase" </a:t>
+            </a:r>
+            <a:r>
+              <a:rPr lang="en-US" dirty="0" err="1"/>
+              <a:t>și</a:t>
+            </a:r>
+            <a:r>
+              <a:rPr lang="en-US" dirty="0"/>
+              <a:t> "online phase" e </a:t>
+            </a:r>
+            <a:r>
+              <a:rPr lang="en-US" dirty="0" err="1"/>
+              <a:t>corect</a:t>
+            </a:r>
+            <a:r>
+              <a:rPr lang="en-US" dirty="0"/>
+              <a:t> </a:t>
+            </a:r>
+            <a:r>
+              <a:rPr lang="en-US" dirty="0" err="1"/>
+              <a:t>și</a:t>
+            </a:r>
+            <a:r>
+              <a:rPr lang="en-US" dirty="0"/>
+              <a:t> compact, </a:t>
+            </a:r>
+            <a:r>
+              <a:rPr lang="en-US" dirty="0" err="1"/>
+              <a:t>dar</a:t>
+            </a:r>
+            <a:r>
+              <a:rPr lang="en-US" dirty="0"/>
+              <a:t> din </a:t>
+            </a:r>
+            <a:r>
+              <a:rPr lang="en-US" dirty="0" err="1"/>
+              <a:t>experiența</a:t>
+            </a:r>
+            <a:r>
+              <a:rPr lang="en-US" dirty="0"/>
+              <a:t> mea, nu e </a:t>
+            </a:r>
+            <a:r>
+              <a:rPr lang="en-US" dirty="0" err="1"/>
+              <a:t>priceput</a:t>
+            </a:r>
+            <a:r>
+              <a:rPr lang="en-US" dirty="0"/>
+              <a:t> </a:t>
+            </a:r>
+            <a:r>
+              <a:rPr lang="en-US" dirty="0" err="1"/>
+              <a:t>repede</a:t>
+            </a:r>
+            <a:r>
+              <a:rPr lang="en-US" dirty="0"/>
+              <a:t> de </a:t>
+            </a:r>
+            <a:r>
+              <a:rPr lang="en-US" dirty="0" err="1"/>
+              <a:t>audiență</a:t>
+            </a:r>
+            <a:endParaRPr lang="en-US" dirty="0"/>
           </a:p>
         </p:txBody>
       </p:sp>
@@ -7500,11 +8540,11 @@
             <a:pPr>
               <a:defRPr/>
             </a:pPr>
-            <a:r>
-              <a:rPr lang="ro-RO" dirty="0" smtClean="0"/>
-              <a:t>16.05.2014</a:t>
-            </a:r>
-            <a:endParaRPr lang="ro-RO" dirty="0"/>
+            <a:fld id="{2E46CBF3-BD55-4394-B644-E24C551F09B7}" type="datetime1">
+              <a:rPr lang="ro-RO" smtClean="0"/>
+              <a:t>04.07.2014</a:t>
+            </a:fld>
+            <a:endParaRPr lang="ro-RO"/>
           </a:p>
         </p:txBody>
       </p:sp>
@@ -7527,8 +8567,8 @@
               <a:defRPr/>
             </a:pPr>
             <a:r>
-              <a:rPr lang="vi-VN" dirty="0" smtClean="0"/>
-              <a:t>Sesiunea de Comunicări Științifice Studențești -  Mai 2014</a:t>
+              <a:rPr lang="vi-VN" smtClean="0"/>
+              <a:t>Sesiunea de Licențe - Iulie 2014</a:t>
             </a:r>
             <a:endParaRPr lang="ro-RO" dirty="0">
               <a:latin typeface="Arial" charset="0"/>
@@ -7566,6 +8606,11 @@
         </p:txBody>
       </p:sp>
     </p:spTree>
+    <p:extLst>
+      <p:ext uri="{BB962C8B-B14F-4D97-AF65-F5344CB8AC3E}">
+        <p14:creationId xmlns:p14="http://schemas.microsoft.com/office/powerpoint/2010/main" val="4291679057"/>
+      </p:ext>
+    </p:extLst>
   </p:cSld>
   <p:clrMapOvr>
     <a:masterClrMapping/>
@@ -7654,10 +8699,10 @@
             <a:pPr>
               <a:defRPr/>
             </a:pPr>
-            <a:r>
-              <a:rPr lang="ro-RO" dirty="0" smtClean="0"/>
-              <a:t>16.05.2014</a:t>
-            </a:r>
+            <a:fld id="{0553A5F6-30AD-4CBE-92E6-6E6AB8F92AE2}" type="datetime1">
+              <a:rPr lang="ro-RO" smtClean="0"/>
+              <a:t>04.07.2014</a:t>
+            </a:fld>
             <a:endParaRPr lang="ro-RO" dirty="0"/>
           </a:p>
         </p:txBody>
@@ -7677,16 +8722,11 @@
           <a:bodyPr/>
           <a:lstStyle/>
           <a:p>
-            <a:pPr>
-              <a:defRPr/>
-            </a:pPr>
-            <a:r>
-              <a:rPr lang="vi-VN" dirty="0" smtClean="0"/>
-              <a:t>Sesiunea de Comunicări Științifice Studențești -  Mai 2014</a:t>
-            </a:r>
-            <a:endParaRPr lang="ro-RO" dirty="0">
-              <a:latin typeface="Arial" charset="0"/>
-            </a:endParaRPr>
+            <a:r>
+              <a:rPr lang="vi-VN" altLang="en-US" smtClean="0"/>
+              <a:t>Sesiunea de Licențe - Iulie 2014</a:t>
+            </a:r>
+            <a:endParaRPr lang="ro-RO" altLang="en-US" dirty="0"/>
           </a:p>
         </p:txBody>
       </p:sp>
@@ -7830,10 +8870,10 @@
             <a:pPr>
               <a:defRPr/>
             </a:pPr>
-            <a:r>
-              <a:rPr lang="ro-RO" dirty="0" smtClean="0"/>
-              <a:t>16.05.2014</a:t>
-            </a:r>
+            <a:fld id="{B3E28288-0EF5-4D7A-BEF1-F53DE4B8A06C}" type="datetime1">
+              <a:rPr lang="ro-RO" smtClean="0"/>
+              <a:t>04.07.2014</a:t>
+            </a:fld>
             <a:endParaRPr lang="ro-RO" dirty="0"/>
           </a:p>
         </p:txBody>
@@ -7853,16 +8893,11 @@
           <a:bodyPr/>
           <a:lstStyle/>
           <a:p>
-            <a:pPr>
-              <a:defRPr/>
-            </a:pPr>
-            <a:r>
-              <a:rPr lang="vi-VN" dirty="0" smtClean="0"/>
-              <a:t>Sesiunea de Comunicări Științifice Studențești -  Mai 2014</a:t>
-            </a:r>
-            <a:endParaRPr lang="ro-RO" dirty="0">
-              <a:latin typeface="Arial" charset="0"/>
-            </a:endParaRPr>
+            <a:r>
+              <a:rPr lang="vi-VN" altLang="en-US" smtClean="0"/>
+              <a:t>Sesiunea de Licențe - Iulie 2014</a:t>
+            </a:r>
+            <a:endParaRPr lang="ro-RO" altLang="en-US" dirty="0"/>
           </a:p>
         </p:txBody>
       </p:sp>

</xml_diff>